<commit_message>
fix order issue with apiVersion & kind in yaml files & screenshots
</commit_message>
<xml_diff>
--- a/kubernetes/05_persistence.pptx
+++ b/kubernetes/05_persistence.pptx
@@ -19186,8 +19186,8 @@
         </p:blipFill>
         <p:spPr>
           <a:xfrm>
-            <a:off x="504000" y="3093720"/>
-            <a:ext cx="3778748" cy="2891564"/>
+            <a:off x="504000" y="2866548"/>
+            <a:ext cx="4075620" cy="3118736"/>
           </a:xfrm>
           <a:prstGeom prst="rect">
             <a:avLst/>
@@ -19196,7 +19196,7 @@
       </p:pic>
       <p:pic>
         <p:nvPicPr>
-          <p:cNvPr id="9" name="Picture 8"/>
+          <p:cNvPr id="4" name="Picture 3"/>
           <p:cNvPicPr>
             <a:picLocks noChangeAspect="1"/>
           </p:cNvPicPr>
@@ -19210,8 +19210,8 @@
         </p:blipFill>
         <p:spPr>
           <a:xfrm>
-            <a:off x="4696675" y="3093720"/>
-            <a:ext cx="3229655" cy="2891564"/>
+            <a:off x="4963361" y="2866548"/>
+            <a:ext cx="2915706" cy="3119377"/>
           </a:xfrm>
           <a:prstGeom prst="rect">
             <a:avLst/>
@@ -19220,7 +19220,7 @@
       </p:pic>
       <p:pic>
         <p:nvPicPr>
-          <p:cNvPr id="10" name="Picture 9"/>
+          <p:cNvPr id="5" name="Picture 4"/>
           <p:cNvPicPr>
             <a:picLocks noChangeAspect="1"/>
           </p:cNvPicPr>
@@ -19234,8 +19234,8 @@
         </p:blipFill>
         <p:spPr>
           <a:xfrm>
-            <a:off x="8449899" y="3093720"/>
-            <a:ext cx="3119845" cy="2891564"/>
+            <a:off x="8255187" y="2870998"/>
+            <a:ext cx="3000000" cy="3114286"/>
           </a:xfrm>
           <a:prstGeom prst="rect">
             <a:avLst/>

</xml_diff>

<commit_message>
further demo scripts for persistence, configmaps and ingress
</commit_message>
<xml_diff>
--- a/kubernetes/05_persistence.pptx
+++ b/kubernetes/05_persistence.pptx
@@ -21,7 +21,7 @@
     <p:sldId id="457" r:id="rId9"/>
     <p:sldId id="458" r:id="rId10"/>
     <p:sldId id="451" r:id="rId11"/>
-    <p:sldId id="454" r:id="rId12"/>
+    <p:sldId id="459" r:id="rId12"/>
     <p:sldId id="455" r:id="rId13"/>
     <p:sldId id="265" r:id="rId14"/>
   </p:sldIdLst>
@@ -199,10 +199,6 @@
 </p:presentation>
 </file>
 
-<file path=ppt/revisionInfo.xml><?xml version="1.0" encoding="utf-8"?>
-<p1510:revInfo xmlns:a="http://schemas.openxmlformats.org/drawingml/2006/main" xmlns:r="http://schemas.openxmlformats.org/officeDocument/2006/relationships" xmlns:p1510="http://schemas.microsoft.com/office/powerpoint/2015/10/main"/>
-</file>
-
 <file path=ppt/handoutMasters/handoutMaster1.xml><?xml version="1.0" encoding="utf-8"?>
 <p:handoutMaster xmlns:a="http://schemas.openxmlformats.org/drawingml/2006/main" xmlns:r="http://schemas.openxmlformats.org/officeDocument/2006/relationships" xmlns:p="http://schemas.openxmlformats.org/presentationml/2006/main">
   <p:cSld>
@@ -719,6 +715,384 @@
 </file>
 
 <file path=ppt/notesSlides/notesSlide11.xml><?xml version="1.0" encoding="utf-8"?>
+<p:notes xmlns:a="http://schemas.openxmlformats.org/drawingml/2006/main" xmlns:r="http://schemas.openxmlformats.org/officeDocument/2006/relationships" xmlns:p="http://schemas.openxmlformats.org/presentationml/2006/main">
+  <p:cSld>
+    <p:spTree>
+      <p:nvGrpSpPr>
+        <p:cNvPr id="1" name=""/>
+        <p:cNvGrpSpPr/>
+        <p:nvPr/>
+      </p:nvGrpSpPr>
+      <p:grpSpPr>
+        <a:xfrm>
+          <a:off x="0" y="0"/>
+          <a:ext cx="0" cy="0"/>
+          <a:chOff x="0" y="0"/>
+          <a:chExt cx="0" cy="0"/>
+        </a:xfrm>
+      </p:grpSpPr>
+      <p:sp>
+        <p:nvSpPr>
+          <p:cNvPr id="2" name="Slide Image Placeholder 1"/>
+          <p:cNvSpPr>
+            <a:spLocks noGrp="1" noRot="1" noChangeAspect="1"/>
+          </p:cNvSpPr>
+          <p:nvPr>
+            <p:ph type="sldImg"/>
+          </p:nvPr>
+        </p:nvSpPr>
+        <p:spPr/>
+      </p:sp>
+      <p:sp>
+        <p:nvSpPr>
+          <p:cNvPr id="3" name="Notes Placeholder 2"/>
+          <p:cNvSpPr>
+            <a:spLocks noGrp="1"/>
+          </p:cNvSpPr>
+          <p:nvPr>
+            <p:ph type="body" idx="1"/>
+          </p:nvPr>
+        </p:nvSpPr>
+        <p:spPr/>
+        <p:txBody>
+          <a:bodyPr/>
+          <a:lstStyle/>
+          <a:p>
+            <a:pPr marL="285750" marR="0" lvl="0" indent="-285750" algn="l" defTabSz="1088776" rtl="0" eaLnBrk="1" fontAlgn="auto" latinLnBrk="0" hangingPunct="1">
+              <a:lnSpc>
+                <a:spcPct val="100000"/>
+              </a:lnSpc>
+              <a:spcBef>
+                <a:spcPts val="0"/>
+              </a:spcBef>
+              <a:spcAft>
+                <a:spcPts val="0"/>
+              </a:spcAft>
+              <a:buClrTx/>
+              <a:buSzTx/>
+              <a:buFontTx/>
+              <a:buChar char="-"/>
+              <a:tabLst/>
+              <a:defRPr/>
+            </a:pPr>
+            <a:r>
+              <a:rPr lang="en-US" baseline="0" dirty="0"/>
+              <a:t>Create a PVC from </a:t>
+            </a:r>
+            <a:r>
+              <a:rPr lang="en-US" baseline="0" dirty="0" err="1"/>
+              <a:t>yaml</a:t>
+            </a:r>
+            <a:endParaRPr lang="en-US" baseline="0" dirty="0"/>
+          </a:p>
+          <a:p>
+            <a:pPr marL="285750" marR="0" lvl="0" indent="-285750" algn="l" defTabSz="1088776" rtl="0" eaLnBrk="1" fontAlgn="auto" latinLnBrk="0" hangingPunct="1">
+              <a:lnSpc>
+                <a:spcPct val="100000"/>
+              </a:lnSpc>
+              <a:spcBef>
+                <a:spcPts val="0"/>
+              </a:spcBef>
+              <a:spcAft>
+                <a:spcPts val="0"/>
+              </a:spcAft>
+              <a:buClrTx/>
+              <a:buSzTx/>
+              <a:buFontTx/>
+              <a:buChar char="-"/>
+              <a:tabLst/>
+              <a:defRPr/>
+            </a:pPr>
+            <a:r>
+              <a:rPr lang="en-US" baseline="0" dirty="0"/>
+              <a:t>Show the storage class reference in the PVC </a:t>
+            </a:r>
+            <a:r>
+              <a:rPr lang="en-US" baseline="0" dirty="0" err="1"/>
+              <a:t>yaml</a:t>
+            </a:r>
+            <a:r>
+              <a:rPr lang="en-US" baseline="0" dirty="0"/>
+              <a:t> and the corresponding storage class within the cluster (</a:t>
+            </a:r>
+            <a:r>
+              <a:rPr lang="en-US" baseline="0" dirty="0" err="1"/>
+              <a:t>kubectl</a:t>
+            </a:r>
+            <a:r>
+              <a:rPr lang="en-US" baseline="0" dirty="0"/>
+              <a:t> get </a:t>
+            </a:r>
+            <a:r>
+              <a:rPr lang="en-US" baseline="0" dirty="0" err="1"/>
+              <a:t>storageclass</a:t>
+            </a:r>
+            <a:r>
+              <a:rPr lang="en-US" baseline="0" dirty="0"/>
+              <a:t>). These have to match!</a:t>
+            </a:r>
+          </a:p>
+          <a:p>
+            <a:pPr marL="285750" marR="0" lvl="0" indent="-285750" algn="l" defTabSz="1088776" rtl="0" eaLnBrk="1" fontAlgn="auto" latinLnBrk="0" hangingPunct="1">
+              <a:lnSpc>
+                <a:spcPct val="100000"/>
+              </a:lnSpc>
+              <a:spcBef>
+                <a:spcPts val="0"/>
+              </a:spcBef>
+              <a:spcAft>
+                <a:spcPts val="0"/>
+              </a:spcAft>
+              <a:buClrTx/>
+              <a:buSzTx/>
+              <a:buFontTx/>
+              <a:buChar char="-"/>
+              <a:tabLst/>
+              <a:defRPr/>
+            </a:pPr>
+            <a:r>
+              <a:rPr lang="en-US" baseline="0" dirty="0"/>
+              <a:t>Query the PV’s and outline the connection between the PVC in the namespace and the PV. Print out the PV </a:t>
+            </a:r>
+            <a:r>
+              <a:rPr lang="en-US" baseline="0" dirty="0" err="1"/>
+              <a:t>yaml</a:t>
+            </a:r>
+            <a:r>
+              <a:rPr lang="en-US" baseline="0" dirty="0"/>
+              <a:t> and highlight that there is no namespace as PV resources are not </a:t>
+            </a:r>
+            <a:r>
+              <a:rPr lang="en-US" baseline="0" dirty="0" err="1"/>
+              <a:t>namespaced</a:t>
+            </a:r>
+            <a:r>
+              <a:rPr lang="en-US" baseline="0" dirty="0"/>
+              <a:t>.</a:t>
+            </a:r>
+          </a:p>
+          <a:p>
+            <a:pPr marL="285750" marR="0" lvl="0" indent="-285750" algn="l" defTabSz="1088776" rtl="0" eaLnBrk="1" fontAlgn="auto" latinLnBrk="0" hangingPunct="1">
+              <a:lnSpc>
+                <a:spcPct val="100000"/>
+              </a:lnSpc>
+              <a:spcBef>
+                <a:spcPts val="0"/>
+              </a:spcBef>
+              <a:spcAft>
+                <a:spcPts val="0"/>
+              </a:spcAft>
+              <a:buClrTx/>
+              <a:buSzTx/>
+              <a:buFontTx/>
+              <a:buChar char="-"/>
+              <a:tabLst/>
+              <a:defRPr/>
+            </a:pPr>
+            <a:endParaRPr lang="en-US" baseline="0" dirty="0"/>
+          </a:p>
+          <a:p>
+            <a:pPr marL="285750" marR="0" lvl="0" indent="-285750" algn="l" defTabSz="1088776" rtl="0" eaLnBrk="1" fontAlgn="auto" latinLnBrk="0" hangingPunct="1">
+              <a:lnSpc>
+                <a:spcPct val="100000"/>
+              </a:lnSpc>
+              <a:spcBef>
+                <a:spcPts val="0"/>
+              </a:spcBef>
+              <a:spcAft>
+                <a:spcPts val="0"/>
+              </a:spcAft>
+              <a:buClrTx/>
+              <a:buSzTx/>
+              <a:buFontTx/>
+              <a:buChar char="-"/>
+              <a:tabLst/>
+              <a:defRPr/>
+            </a:pPr>
+            <a:r>
+              <a:rPr lang="en-US" baseline="0" dirty="0"/>
+              <a:t>Create a pod where the PVC is mounted. Discuss the volume &amp; </a:t>
+            </a:r>
+            <a:r>
+              <a:rPr lang="en-US" baseline="0" dirty="0" err="1"/>
+              <a:t>volumeMount</a:t>
+            </a:r>
+            <a:r>
+              <a:rPr lang="en-US" baseline="0" dirty="0"/>
+              <a:t> section and highlight the matching names for the volume within the pod spec to make it referenceable.</a:t>
+            </a:r>
+          </a:p>
+          <a:p>
+            <a:pPr marL="285750" marR="0" lvl="0" indent="-285750" algn="l" defTabSz="1088776" rtl="0" eaLnBrk="1" fontAlgn="auto" latinLnBrk="0" hangingPunct="1">
+              <a:lnSpc>
+                <a:spcPct val="100000"/>
+              </a:lnSpc>
+              <a:spcBef>
+                <a:spcPts val="0"/>
+              </a:spcBef>
+              <a:spcAft>
+                <a:spcPts val="0"/>
+              </a:spcAft>
+              <a:buClrTx/>
+              <a:buSzTx/>
+              <a:buFontTx/>
+              <a:buChar char="-"/>
+              <a:tabLst/>
+              <a:defRPr/>
+            </a:pPr>
+            <a:r>
+              <a:rPr lang="en-US" baseline="0" dirty="0"/>
+              <a:t>Once the pod is created, logon to it and create some content.</a:t>
+            </a:r>
+          </a:p>
+          <a:p>
+            <a:pPr marL="285750" marR="0" lvl="0" indent="-285750" algn="l" defTabSz="1088776" rtl="0" eaLnBrk="1" fontAlgn="auto" latinLnBrk="0" hangingPunct="1">
+              <a:lnSpc>
+                <a:spcPct val="100000"/>
+              </a:lnSpc>
+              <a:spcBef>
+                <a:spcPts val="0"/>
+              </a:spcBef>
+              <a:spcAft>
+                <a:spcPts val="0"/>
+              </a:spcAft>
+              <a:buClrTx/>
+              <a:buSzTx/>
+              <a:buFontTx/>
+              <a:buChar char="-"/>
+              <a:tabLst/>
+              <a:defRPr/>
+            </a:pPr>
+            <a:r>
+              <a:rPr lang="en-US" baseline="0" dirty="0"/>
+              <a:t>In parallel, create a </a:t>
+            </a:r>
+            <a:r>
+              <a:rPr lang="en-US" baseline="0" dirty="0" err="1"/>
+              <a:t>deployemtn</a:t>
+            </a:r>
+            <a:r>
+              <a:rPr lang="en-US" baseline="0" dirty="0"/>
+              <a:t> that attempts to mount the same PVC. </a:t>
+            </a:r>
+          </a:p>
+          <a:p>
+            <a:pPr marL="465750" marR="0" lvl="1" indent="-285750" algn="l" defTabSz="1088776" rtl="0" eaLnBrk="1" fontAlgn="auto" latinLnBrk="0" hangingPunct="1">
+              <a:lnSpc>
+                <a:spcPct val="100000"/>
+              </a:lnSpc>
+              <a:spcBef>
+                <a:spcPts val="0"/>
+              </a:spcBef>
+              <a:spcAft>
+                <a:spcPts val="0"/>
+              </a:spcAft>
+              <a:buClrTx/>
+              <a:buSzTx/>
+              <a:buFontTx/>
+              <a:buChar char="-"/>
+              <a:tabLst/>
+              <a:defRPr/>
+            </a:pPr>
+            <a:r>
+              <a:rPr lang="en-US" baseline="0" dirty="0"/>
+              <a:t>Discuss the error message (</a:t>
+            </a:r>
+            <a:r>
+              <a:rPr lang="en-US" baseline="0" dirty="0" err="1"/>
+              <a:t>kubectl</a:t>
+            </a:r>
+            <a:r>
+              <a:rPr lang="en-US" baseline="0" dirty="0"/>
+              <a:t> describe pod &lt;pod of a deployment&gt;)</a:t>
+            </a:r>
+          </a:p>
+          <a:p>
+            <a:pPr marL="465750" marR="0" lvl="1" indent="-285750" algn="l" defTabSz="1088776" rtl="0" eaLnBrk="1" fontAlgn="auto" latinLnBrk="0" hangingPunct="1">
+              <a:lnSpc>
+                <a:spcPct val="100000"/>
+              </a:lnSpc>
+              <a:spcBef>
+                <a:spcPts val="0"/>
+              </a:spcBef>
+              <a:spcAft>
+                <a:spcPts val="0"/>
+              </a:spcAft>
+              <a:buClrTx/>
+              <a:buSzTx/>
+              <a:buFontTx/>
+              <a:buChar char="-"/>
+              <a:tabLst/>
+              <a:defRPr/>
+            </a:pPr>
+            <a:r>
+              <a:rPr lang="en-US" baseline="0" dirty="0"/>
+              <a:t>Outline the implication of the access-mode. If the PVC is already bound once in RWO mode, it cannot be bound in any other mode. </a:t>
+            </a:r>
+          </a:p>
+          <a:p>
+            <a:pPr marL="465750" marR="0" lvl="1" indent="-285750" algn="l" defTabSz="1088776" rtl="0" eaLnBrk="1" fontAlgn="auto" latinLnBrk="0" hangingPunct="1">
+              <a:lnSpc>
+                <a:spcPct val="100000"/>
+              </a:lnSpc>
+              <a:spcBef>
+                <a:spcPts val="0"/>
+              </a:spcBef>
+              <a:spcAft>
+                <a:spcPts val="0"/>
+              </a:spcAft>
+              <a:buClrTx/>
+              <a:buSzTx/>
+              <a:buFontTx/>
+              <a:buChar char="-"/>
+              <a:tabLst/>
+              <a:defRPr/>
+            </a:pPr>
+            <a:r>
+              <a:rPr lang="en-US" baseline="0" dirty="0"/>
+              <a:t>To get the example working the first pod would need to be removed and all other pods would  need to be re-created.</a:t>
+            </a:r>
+          </a:p>
+        </p:txBody>
+      </p:sp>
+      <p:sp>
+        <p:nvSpPr>
+          <p:cNvPr id="4" name="Slide Number Placeholder 3"/>
+          <p:cNvSpPr>
+            <a:spLocks noGrp="1"/>
+          </p:cNvSpPr>
+          <p:nvPr>
+            <p:ph type="sldNum" sz="quarter" idx="10"/>
+          </p:nvPr>
+        </p:nvSpPr>
+        <p:spPr/>
+        <p:txBody>
+          <a:bodyPr/>
+          <a:lstStyle/>
+          <a:p>
+            <a:fld id="{7D8C2C35-2B8A-446E-BEC0-FD36716C29AC}" type="slidenum">
+              <a:rPr lang="de-DE" smtClean="0"/>
+              <a:pPr/>
+              <a:t>11</a:t>
+            </a:fld>
+            <a:endParaRPr lang="de-DE" dirty="0"/>
+          </a:p>
+        </p:txBody>
+      </p:sp>
+    </p:spTree>
+    <p:extLst>
+      <p:ext uri="{BB962C8B-B14F-4D97-AF65-F5344CB8AC3E}">
+        <p14:creationId xmlns:p14="http://schemas.microsoft.com/office/powerpoint/2010/main" val="830541180"/>
+      </p:ext>
+    </p:extLst>
+  </p:cSld>
+  <p:clrMapOvr>
+    <a:masterClrMapping/>
+  </p:clrMapOvr>
+</p:notes>
+</file>
+
+<file path=ppt/notesSlides/notesSlide12.xml><?xml version="1.0" encoding="utf-8"?>
 <p:notes xmlns:a="http://schemas.openxmlformats.org/drawingml/2006/main" xmlns:r="http://schemas.openxmlformats.org/officeDocument/2006/relationships" xmlns:p="http://schemas.openxmlformats.org/presentationml/2006/main">
   <p:cSld>
     <p:spTree>
@@ -18571,7 +18945,7 @@
 </file>
 
 <file path=ppt/slides/slide11.xml><?xml version="1.0" encoding="utf-8"?>
-<p:sld xmlns:a="http://schemas.openxmlformats.org/drawingml/2006/main" xmlns:r="http://schemas.openxmlformats.org/officeDocument/2006/relationships" xmlns:p="http://schemas.openxmlformats.org/presentationml/2006/main" show="0">
+<p:sld xmlns:a="http://schemas.openxmlformats.org/drawingml/2006/main" xmlns:r="http://schemas.openxmlformats.org/officeDocument/2006/relationships" xmlns:p="http://schemas.openxmlformats.org/presentationml/2006/main">
   <p:cSld>
     <p:spTree>
       <p:nvGrpSpPr>
@@ -18589,71 +18963,7 @@
       </p:grpSpPr>
       <p:sp>
         <p:nvSpPr>
-          <p:cNvPr id="5" name="Text Placeholder 4"/>
-          <p:cNvSpPr>
-            <a:spLocks noGrp="1"/>
-          </p:cNvSpPr>
-          <p:nvPr>
-            <p:ph type="body" sz="quarter" idx="10"/>
-          </p:nvPr>
-        </p:nvSpPr>
-        <p:spPr/>
-        <p:txBody>
-          <a:bodyPr/>
-          <a:lstStyle/>
-          <a:p>
-            <a:pPr marL="342900" indent="-342900">
-              <a:buFontTx/>
-              <a:buChar char="-"/>
-            </a:pPr>
-            <a:r>
-              <a:rPr lang="en-US" dirty="0"/>
-              <a:t>Show existing PV &amp; PVC</a:t>
-            </a:r>
-          </a:p>
-          <a:p>
-            <a:pPr marL="342900" indent="-342900">
-              <a:buFontTx/>
-              <a:buChar char="-"/>
-            </a:pPr>
-            <a:r>
-              <a:rPr lang="en-US" dirty="0"/>
-              <a:t>Show storage class</a:t>
-            </a:r>
-          </a:p>
-          <a:p>
-            <a:pPr marL="342900" indent="-342900">
-              <a:buFontTx/>
-              <a:buChar char="-"/>
-            </a:pPr>
-            <a:r>
-              <a:rPr lang="en-US" dirty="0"/>
-              <a:t>Create </a:t>
-            </a:r>
-            <a:r>
-              <a:rPr lang="en-US"/>
-              <a:t>a PVC </a:t>
-            </a:r>
-            <a:r>
-              <a:rPr lang="en-US" dirty="0"/>
-              <a:t>and display status </a:t>
-            </a:r>
-          </a:p>
-          <a:p>
-            <a:pPr marL="342900" indent="-342900">
-              <a:buFontTx/>
-              <a:buChar char="-"/>
-            </a:pPr>
-            <a:r>
-              <a:rPr lang="en-US" dirty="0"/>
-              <a:t>Show corresponding PV</a:t>
-            </a:r>
-          </a:p>
-        </p:txBody>
-      </p:sp>
-      <p:sp>
-        <p:nvSpPr>
-          <p:cNvPr id="4" name="Title 3"/>
+          <p:cNvPr id="3" name="Title 2"/>
           <p:cNvSpPr>
             <a:spLocks noGrp="1"/>
           </p:cNvSpPr>
@@ -18673,10 +18983,40 @@
           </a:p>
         </p:txBody>
       </p:sp>
+      <p:pic>
+        <p:nvPicPr>
+          <p:cNvPr id="4" name="Picture 3">
+            <a:extLst>
+              <a:ext uri="{FF2B5EF4-FFF2-40B4-BE49-F238E27FC236}">
+                <a16:creationId xmlns:a16="http://schemas.microsoft.com/office/drawing/2014/main" id="{667C7630-D1BA-44ED-BD0C-E0F24DE56B91}"/>
+              </a:ext>
+            </a:extLst>
+          </p:cNvPr>
+          <p:cNvPicPr>
+            <a:picLocks noChangeAspect="1"/>
+          </p:cNvPicPr>
+          <p:nvPr/>
+        </p:nvPicPr>
+        <p:blipFill>
+          <a:blip r:embed="rId3"/>
+          <a:stretch>
+            <a:fillRect/>
+          </a:stretch>
+        </p:blipFill>
+        <p:spPr>
+          <a:xfrm>
+            <a:off x="3849419" y="1181180"/>
+            <a:ext cx="4495640" cy="4495640"/>
+          </a:xfrm>
+          <a:prstGeom prst="rect">
+            <a:avLst/>
+          </a:prstGeom>
+        </p:spPr>
+      </p:pic>
     </p:spTree>
     <p:extLst>
       <p:ext uri="{BB962C8B-B14F-4D97-AF65-F5344CB8AC3E}">
-        <p14:creationId xmlns:p14="http://schemas.microsoft.com/office/powerpoint/2010/main" val="985530164"/>
+        <p14:creationId xmlns:p14="http://schemas.microsoft.com/office/powerpoint/2010/main" val="3012707076"/>
       </p:ext>
     </p:extLst>
   </p:cSld>
@@ -18720,7 +19060,7 @@
           <a:p>
             <a:r>
               <a:rPr lang="en-US" dirty="0"/>
-              <a:t>What YOU will do during the next exercise…</a:t>
+              <a:t>What YOU will do in exercise #05</a:t>
             </a:r>
           </a:p>
         </p:txBody>

</xml_diff>

<commit_message>
fix wrong access mode in PVC screenshot
</commit_message>
<xml_diff>
--- a/kubernetes/05_persistence.pptx
+++ b/kubernetes/05_persistence.pptx
@@ -22930,7 +22930,7 @@
       </p:pic>
       <p:pic>
         <p:nvPicPr>
-          <p:cNvPr id="4" name="Picture 3"/>
+          <p:cNvPr id="5" name="Picture 4"/>
           <p:cNvPicPr>
             <a:picLocks noChangeAspect="1"/>
           </p:cNvPicPr>
@@ -22944,8 +22944,8 @@
         </p:blipFill>
         <p:spPr>
           <a:xfrm>
-            <a:off x="4963361" y="2564707"/>
-            <a:ext cx="2915706" cy="3119377"/>
+            <a:off x="8255187" y="2569157"/>
+            <a:ext cx="3000000" cy="3114286"/>
           </a:xfrm>
           <a:prstGeom prst="rect">
             <a:avLst/>
@@ -22954,7 +22954,13 @@
       </p:pic>
       <p:pic>
         <p:nvPicPr>
-          <p:cNvPr id="5" name="Picture 4"/>
+          <p:cNvPr id="8" name="Picture 7">
+            <a:extLst>
+              <a:ext uri="{FF2B5EF4-FFF2-40B4-BE49-F238E27FC236}">
+                <a16:creationId xmlns:a16="http://schemas.microsoft.com/office/drawing/2014/main" id="{8A5AE7F5-FDDA-46CC-B28B-96C64850415D}"/>
+              </a:ext>
+            </a:extLst>
+          </p:cNvPr>
           <p:cNvPicPr>
             <a:picLocks noChangeAspect="1"/>
           </p:cNvPicPr>
@@ -22968,8 +22974,8 @@
         </p:blipFill>
         <p:spPr>
           <a:xfrm>
-            <a:off x="8255187" y="2569157"/>
-            <a:ext cx="3000000" cy="3114286"/>
+            <a:off x="5209651" y="2564707"/>
+            <a:ext cx="2415506" cy="2331384"/>
           </a:xfrm>
           <a:prstGeom prst="rect">
             <a:avLst/>
@@ -22998,6 +23004,9 @@
                     <p:cTn id="3" fill="hold">
                       <p:stCondLst>
                         <p:cond delay="indefinite"/>
+                        <p:cond evt="onBegin" delay="0">
+                          <p:tn val="2"/>
+                        </p:cond>
                       </p:stCondLst>
                       <p:childTnLst>
                         <p:par>
@@ -23007,7 +23016,7 @@
                             </p:stCondLst>
                             <p:childTnLst>
                               <p:par>
-                                <p:cTn id="5" presetID="1" presetClass="entr" presetSubtype="0" fill="hold" nodeType="clickEffect">
+                                <p:cTn id="5" presetID="1" presetClass="entr" presetSubtype="0" fill="hold" grpId="0" nodeType="withEffect">
                                   <p:stCondLst>
                                     <p:cond delay="0"/>
                                   </p:stCondLst>
@@ -23015,33 +23024,6 @@
                                     <p:set>
                                       <p:cBhvr>
                                         <p:cTn id="6" dur="1" fill="hold">
-                                          <p:stCondLst>
-                                            <p:cond delay="0"/>
-                                          </p:stCondLst>
-                                        </p:cTn>
-                                        <p:tgtEl>
-                                          <p:spTgt spid="4"/>
-                                        </p:tgtEl>
-                                        <p:attrNameLst>
-                                          <p:attrName>style.visibility</p:attrName>
-                                        </p:attrNameLst>
-                                      </p:cBhvr>
-                                      <p:to>
-                                        <p:strVal val="visible"/>
-                                      </p:to>
-                                    </p:set>
-                                  </p:childTnLst>
-                                </p:cTn>
-                              </p:par>
-                              <p:par>
-                                <p:cTn id="7" presetID="1" presetClass="entr" presetSubtype="0" fill="hold" grpId="0" nodeType="withEffect">
-                                  <p:stCondLst>
-                                    <p:cond delay="0"/>
-                                  </p:stCondLst>
-                                  <p:childTnLst>
-                                    <p:set>
-                                      <p:cBhvr>
-                                        <p:cTn id="8" dur="1" fill="hold">
                                           <p:stCondLst>
                                             <p:cond delay="0"/>
                                           </p:stCondLst>
@@ -23067,26 +23049,26 @@
                     </p:cTn>
                   </p:par>
                   <p:par>
-                    <p:cTn id="9" fill="hold">
+                    <p:cTn id="7" fill="hold">
                       <p:stCondLst>
                         <p:cond delay="indefinite"/>
                       </p:stCondLst>
                       <p:childTnLst>
                         <p:par>
-                          <p:cTn id="10" fill="hold">
+                          <p:cTn id="8" fill="hold">
                             <p:stCondLst>
                               <p:cond delay="0"/>
                             </p:stCondLst>
                             <p:childTnLst>
                               <p:par>
-                                <p:cTn id="11" presetID="1" presetClass="entr" presetSubtype="0" fill="hold" nodeType="clickEffect">
+                                <p:cTn id="9" presetID="1" presetClass="entr" presetSubtype="0" fill="hold" nodeType="clickEffect">
                                   <p:stCondLst>
                                     <p:cond delay="0"/>
                                   </p:stCondLst>
                                   <p:childTnLst>
                                     <p:set>
                                       <p:cBhvr>
-                                        <p:cTn id="12" dur="1" fill="hold">
+                                        <p:cTn id="10" dur="1" fill="hold">
                                           <p:stCondLst>
                                             <p:cond delay="0"/>
                                           </p:stCondLst>

</xml_diff>

<commit_message>
#223 added lifecycle slide
</commit_message>
<xml_diff>
--- a/kubernetes/05_persistence.pptx
+++ b/kubernetes/05_persistence.pptx
@@ -5,10 +5,10 @@
     <p:sldMasterId id="2147483733" r:id="rId1"/>
   </p:sldMasterIdLst>
   <p:notesMasterIdLst>
-    <p:notesMasterId r:id="rId21"/>
+    <p:notesMasterId r:id="rId22"/>
   </p:notesMasterIdLst>
   <p:handoutMasterIdLst>
-    <p:handoutMasterId r:id="rId22"/>
+    <p:handoutMasterId r:id="rId23"/>
   </p:handoutMasterIdLst>
   <p:sldIdLst>
     <p:sldId id="433" r:id="rId2"/>
@@ -20,16 +20,17 @@
     <p:sldId id="450" r:id="rId8"/>
     <p:sldId id="460" r:id="rId9"/>
     <p:sldId id="451" r:id="rId10"/>
-    <p:sldId id="458" r:id="rId11"/>
-    <p:sldId id="464" r:id="rId12"/>
-    <p:sldId id="463" r:id="rId13"/>
-    <p:sldId id="465" r:id="rId14"/>
-    <p:sldId id="457" r:id="rId15"/>
-    <p:sldId id="461" r:id="rId16"/>
-    <p:sldId id="459" r:id="rId17"/>
-    <p:sldId id="455" r:id="rId18"/>
-    <p:sldId id="453" r:id="rId19"/>
-    <p:sldId id="265" r:id="rId20"/>
+    <p:sldId id="466" r:id="rId11"/>
+    <p:sldId id="457" r:id="rId12"/>
+    <p:sldId id="458" r:id="rId13"/>
+    <p:sldId id="464" r:id="rId14"/>
+    <p:sldId id="463" r:id="rId15"/>
+    <p:sldId id="465" r:id="rId16"/>
+    <p:sldId id="461" r:id="rId17"/>
+    <p:sldId id="459" r:id="rId18"/>
+    <p:sldId id="455" r:id="rId19"/>
+    <p:sldId id="453" r:id="rId20"/>
+    <p:sldId id="265" r:id="rId21"/>
   </p:sldIdLst>
   <p:sldSz cx="12195175" cy="6858000"/>
   <p:notesSz cx="6858000" cy="9144000"/>
@@ -676,16 +677,43 @@
           <a:p>
             <a:r>
               <a:rPr lang="en-US" dirty="0"/>
-              <a:t>Modes depend on the storage backend (physical storage). Example for RWX is NFS</a:t>
-            </a:r>
-          </a:p>
-          <a:p>
-            <a:endParaRPr lang="en-US" dirty="0"/>
+              <a:t>Upon deletion of the claim object the persistent volume becomes “unbound”. </a:t>
+            </a:r>
           </a:p>
           <a:p>
             <a:r>
               <a:rPr lang="en-US" dirty="0"/>
-              <a:t>https://kubernetes.io/docs/concepts/storage/persistent-volumes/#access-modes</a:t>
+              <a:t>There are 3 scenarios:</a:t>
+            </a:r>
+          </a:p>
+          <a:p>
+            <a:pPr marL="285750" indent="-285750">
+              <a:buFontTx/>
+              <a:buChar char="-"/>
+            </a:pPr>
+            <a:r>
+              <a:rPr lang="en-US" dirty="0"/>
+              <a:t>Retain: nothing happens, the PV will remain until an administrator deals with it. The data is not (yet) deleted.</a:t>
+            </a:r>
+          </a:p>
+          <a:p>
+            <a:pPr marL="285750" indent="-285750">
+              <a:buFontTx/>
+              <a:buChar char="-"/>
+            </a:pPr>
+            <a:r>
+              <a:rPr lang="en-US" dirty="0"/>
+              <a:t>Delete:  together with the PVC also the PV will be deleted. All data is gone.</a:t>
+            </a:r>
+          </a:p>
+          <a:p>
+            <a:pPr marL="285750" indent="-285750">
+              <a:buFontTx/>
+              <a:buChar char="-"/>
+            </a:pPr>
+            <a:r>
+              <a:rPr lang="en-US" dirty="0"/>
+              <a:t>Recycle (deprecated):  remove all data and make PV available to be bound again by a different PVC</a:t>
             </a:r>
           </a:p>
         </p:txBody>
@@ -717,7 +745,7 @@
     </p:spTree>
     <p:extLst>
       <p:ext uri="{BB962C8B-B14F-4D97-AF65-F5344CB8AC3E}">
-        <p14:creationId xmlns:p14="http://schemas.microsoft.com/office/powerpoint/2010/main" val="2475179647"/>
+        <p14:creationId xmlns:p14="http://schemas.microsoft.com/office/powerpoint/2010/main" val="3990076529"/>
       </p:ext>
     </p:extLst>
   </p:cSld>
@@ -773,16 +801,43 @@
           <a:p>
             <a:r>
               <a:rPr lang="en-US" dirty="0"/>
-              <a:t>While abstraction is easy to work with, it is also quite helpful to know, what is happening in the background.</a:t>
-            </a:r>
-          </a:p>
-          <a:p>
-            <a:endParaRPr lang="en-US" dirty="0"/>
+              <a:t>Upon deletion of the claim object the persistent volume becomes “unbound”. </a:t>
+            </a:r>
           </a:p>
           <a:p>
             <a:r>
               <a:rPr lang="en-US" dirty="0"/>
-              <a:t>When declaring the pod spec with it’s volume mount section, in the end it refers to some physical storage. To get actual access to it, the disk needs to be mounted to the node first. Only then the docker daemon can use a bind mount to make the disk available to the container.</a:t>
+              <a:t>There are 3 scenarios:</a:t>
+            </a:r>
+          </a:p>
+          <a:p>
+            <a:pPr marL="285750" indent="-285750">
+              <a:buFontTx/>
+              <a:buChar char="-"/>
+            </a:pPr>
+            <a:r>
+              <a:rPr lang="en-US" dirty="0"/>
+              <a:t>Retain: nothing happens, the PV will remain until an administrator deals with it. The data is not (yet) deleted.</a:t>
+            </a:r>
+          </a:p>
+          <a:p>
+            <a:pPr marL="285750" indent="-285750">
+              <a:buFontTx/>
+              <a:buChar char="-"/>
+            </a:pPr>
+            <a:r>
+              <a:rPr lang="en-US" dirty="0"/>
+              <a:t>Delete:  together with the PVC also the PV will be deleted. All data is gone.</a:t>
+            </a:r>
+          </a:p>
+          <a:p>
+            <a:pPr marL="285750" indent="-285750">
+              <a:buFontTx/>
+              <a:buChar char="-"/>
+            </a:pPr>
+            <a:r>
+              <a:rPr lang="en-US" dirty="0"/>
+              <a:t>Recycle (deprecated):  remove all data and make PV available to be bound again by a different PVC</a:t>
             </a:r>
           </a:p>
         </p:txBody>
@@ -794,7 +849,7 @@
             <a:spLocks noGrp="1"/>
           </p:cNvSpPr>
           <p:nvPr>
-            <p:ph type="sldNum" sz="quarter" idx="5"/>
+            <p:ph type="sldNum" sz="quarter" idx="10"/>
           </p:nvPr>
         </p:nvSpPr>
         <p:spPr/>
@@ -814,7 +869,7 @@
     </p:spTree>
     <p:extLst>
       <p:ext uri="{BB962C8B-B14F-4D97-AF65-F5344CB8AC3E}">
-        <p14:creationId xmlns:p14="http://schemas.microsoft.com/office/powerpoint/2010/main" val="1362477786"/>
+        <p14:creationId xmlns:p14="http://schemas.microsoft.com/office/powerpoint/2010/main" val="685690479"/>
       </p:ext>
     </p:extLst>
   </p:cSld>
@@ -870,7 +925,7 @@
           <a:p>
             <a:r>
               <a:rPr lang="en-US" dirty="0"/>
-              <a:t>While abstraction is easy to work with, it is also quite helpful to know, what is happening in the background.</a:t>
+              <a:t>Modes depend on the storage backend (physical storage). Example for RWX is NFS</a:t>
             </a:r>
           </a:p>
           <a:p>
@@ -879,7 +934,7 @@
           <a:p>
             <a:r>
               <a:rPr lang="en-US" dirty="0"/>
-              <a:t>When declaring the pod spec with it’s volume mount section, in the end it refers to some physical storage. To get actual access to it, the disk needs to be mounted to the node first. Only then the docker daemon can use a bind mount to make the disk available to the container.</a:t>
+              <a:t>https://kubernetes.io/docs/concepts/storage/persistent-volumes/#access-modes</a:t>
             </a:r>
           </a:p>
         </p:txBody>
@@ -891,7 +946,7 @@
             <a:spLocks noGrp="1"/>
           </p:cNvSpPr>
           <p:nvPr>
-            <p:ph type="sldNum" sz="quarter" idx="5"/>
+            <p:ph type="sldNum" sz="quarter" idx="10"/>
           </p:nvPr>
         </p:nvSpPr>
         <p:spPr/>
@@ -911,7 +966,7 @@
     </p:spTree>
     <p:extLst>
       <p:ext uri="{BB962C8B-B14F-4D97-AF65-F5344CB8AC3E}">
-        <p14:creationId xmlns:p14="http://schemas.microsoft.com/office/powerpoint/2010/main" val="1692118604"/>
+        <p14:creationId xmlns:p14="http://schemas.microsoft.com/office/powerpoint/2010/main" val="2475179647"/>
       </p:ext>
     </p:extLst>
   </p:cSld>
@@ -1008,7 +1063,7 @@
     </p:spTree>
     <p:extLst>
       <p:ext uri="{BB962C8B-B14F-4D97-AF65-F5344CB8AC3E}">
-        <p14:creationId xmlns:p14="http://schemas.microsoft.com/office/powerpoint/2010/main" val="702230564"/>
+        <p14:creationId xmlns:p14="http://schemas.microsoft.com/office/powerpoint/2010/main" val="1362477786"/>
       </p:ext>
     </p:extLst>
   </p:cSld>
@@ -1064,43 +1119,16 @@
           <a:p>
             <a:r>
               <a:rPr lang="en-US" dirty="0"/>
-              <a:t>Upon deletion of the claim object the persistent volume becomes “unbound”. </a:t>
-            </a:r>
+              <a:t>While abstraction is easy to work with, it is also quite helpful to know, what is happening in the background.</a:t>
+            </a:r>
+          </a:p>
+          <a:p>
+            <a:endParaRPr lang="en-US" dirty="0"/>
           </a:p>
           <a:p>
             <a:r>
               <a:rPr lang="en-US" dirty="0"/>
-              <a:t>There are 3 scenarios:</a:t>
-            </a:r>
-          </a:p>
-          <a:p>
-            <a:pPr marL="285750" indent="-285750">
-              <a:buFontTx/>
-              <a:buChar char="-"/>
-            </a:pPr>
-            <a:r>
-              <a:rPr lang="en-US" dirty="0"/>
-              <a:t>Retain: nothing happens, the PV will remain until an administrator deals with it. The data is not (yet) deleted.</a:t>
-            </a:r>
-          </a:p>
-          <a:p>
-            <a:pPr marL="285750" indent="-285750">
-              <a:buFontTx/>
-              <a:buChar char="-"/>
-            </a:pPr>
-            <a:r>
-              <a:rPr lang="en-US" dirty="0"/>
-              <a:t>Delete:  together with the PVC also the PV will be deleted. All data is gone.</a:t>
-            </a:r>
-          </a:p>
-          <a:p>
-            <a:pPr marL="285750" indent="-285750">
-              <a:buFontTx/>
-              <a:buChar char="-"/>
-            </a:pPr>
-            <a:r>
-              <a:rPr lang="en-US" dirty="0"/>
-              <a:t>Recycle (deprecated):  remove all data and make PV available to be bound again by a different PVC</a:t>
+              <a:t>When declaring the pod spec with it’s volume mount section, in the end it refers to some physical storage. To get actual access to it, the disk needs to be mounted to the node first. Only then the docker daemon can use a bind mount to make the disk available to the container.</a:t>
             </a:r>
           </a:p>
         </p:txBody>
@@ -1112,7 +1140,7 @@
             <a:spLocks noGrp="1"/>
           </p:cNvSpPr>
           <p:nvPr>
-            <p:ph type="sldNum" sz="quarter" idx="10"/>
+            <p:ph type="sldNum" sz="quarter" idx="5"/>
           </p:nvPr>
         </p:nvSpPr>
         <p:spPr/>
@@ -1132,7 +1160,7 @@
     </p:spTree>
     <p:extLst>
       <p:ext uri="{BB962C8B-B14F-4D97-AF65-F5344CB8AC3E}">
-        <p14:creationId xmlns:p14="http://schemas.microsoft.com/office/powerpoint/2010/main" val="685690479"/>
+        <p14:creationId xmlns:p14="http://schemas.microsoft.com/office/powerpoint/2010/main" val="1692118604"/>
       </p:ext>
     </p:extLst>
   </p:cSld>
@@ -1188,7 +1216,7 @@
           <a:p>
             <a:r>
               <a:rPr lang="en-US" dirty="0"/>
-              <a:t>https://kubernetes.io/docs/concepts/storage/persistent-volumes/#types-of-persistent-volumes</a:t>
+              <a:t>While abstraction is easy to work with, it is also quite helpful to know, what is happening in the background.</a:t>
             </a:r>
           </a:p>
           <a:p>
@@ -1197,7 +1225,7 @@
           <a:p>
             <a:r>
               <a:rPr lang="en-US" dirty="0"/>
-              <a:t>https://kubernetes.io/docs/concepts/storage/persistent-volumes/#access-modes</a:t>
+              <a:t>When declaring the pod spec with it’s volume mount section, in the end it refers to some physical storage. To get actual access to it, the disk needs to be mounted to the node first. Only then the docker daemon can use a bind mount to make the disk available to the container.</a:t>
             </a:r>
           </a:p>
         </p:txBody>
@@ -1209,7 +1237,7 @@
             <a:spLocks noGrp="1"/>
           </p:cNvSpPr>
           <p:nvPr>
-            <p:ph type="sldNum" sz="quarter" idx="10"/>
+            <p:ph type="sldNum" sz="quarter" idx="5"/>
           </p:nvPr>
         </p:nvSpPr>
         <p:spPr/>
@@ -1229,7 +1257,7 @@
     </p:spTree>
     <p:extLst>
       <p:ext uri="{BB962C8B-B14F-4D97-AF65-F5344CB8AC3E}">
-        <p14:creationId xmlns:p14="http://schemas.microsoft.com/office/powerpoint/2010/main" val="3695363802"/>
+        <p14:creationId xmlns:p14="http://schemas.microsoft.com/office/powerpoint/2010/main" val="702230564"/>
       </p:ext>
     </p:extLst>
   </p:cSld>
@@ -1283,299 +1311,18 @@
           <a:bodyPr/>
           <a:lstStyle/>
           <a:p>
-            <a:pPr marL="285750" marR="0" lvl="0" indent="-285750" algn="l" defTabSz="1088776" rtl="0" eaLnBrk="1" fontAlgn="auto" latinLnBrk="0" hangingPunct="1">
-              <a:lnSpc>
-                <a:spcPct val="100000"/>
-              </a:lnSpc>
-              <a:spcBef>
-                <a:spcPts val="0"/>
-              </a:spcBef>
-              <a:spcAft>
-                <a:spcPts val="0"/>
-              </a:spcAft>
-              <a:buClrTx/>
-              <a:buSzTx/>
-              <a:buFontTx/>
-              <a:buChar char="-"/>
-              <a:tabLst/>
-              <a:defRPr/>
-            </a:pPr>
-            <a:r>
-              <a:rPr lang="en-US" baseline="0" dirty="0"/>
-              <a:t>Create a PVC from </a:t>
-            </a:r>
-            <a:r>
-              <a:rPr lang="en-US" baseline="0" dirty="0" err="1"/>
-              <a:t>yaml</a:t>
-            </a:r>
-            <a:endParaRPr lang="en-US" baseline="0" dirty="0"/>
-          </a:p>
-          <a:p>
-            <a:pPr marL="285750" marR="0" lvl="0" indent="-285750" algn="l" defTabSz="1088776" rtl="0" eaLnBrk="1" fontAlgn="auto" latinLnBrk="0" hangingPunct="1">
-              <a:lnSpc>
-                <a:spcPct val="100000"/>
-              </a:lnSpc>
-              <a:spcBef>
-                <a:spcPts val="0"/>
-              </a:spcBef>
-              <a:spcAft>
-                <a:spcPts val="0"/>
-              </a:spcAft>
-              <a:buClrTx/>
-              <a:buSzTx/>
-              <a:buFontTx/>
-              <a:buChar char="-"/>
-              <a:tabLst/>
-              <a:defRPr/>
-            </a:pPr>
-            <a:r>
-              <a:rPr lang="en-US" baseline="0" dirty="0"/>
-              <a:t>Show the storage class reference in the PVC </a:t>
-            </a:r>
-            <a:r>
-              <a:rPr lang="en-US" baseline="0" dirty="0" err="1"/>
-              <a:t>yaml</a:t>
-            </a:r>
-            <a:r>
-              <a:rPr lang="en-US" baseline="0" dirty="0"/>
-              <a:t> and the corresponding storage class within the cluster (</a:t>
-            </a:r>
-            <a:r>
-              <a:rPr lang="en-US" baseline="0" dirty="0" err="1"/>
-              <a:t>kubectl</a:t>
-            </a:r>
-            <a:r>
-              <a:rPr lang="en-US" baseline="0" dirty="0"/>
-              <a:t> get </a:t>
-            </a:r>
-            <a:r>
-              <a:rPr lang="en-US" baseline="0" dirty="0" err="1"/>
-              <a:t>storageclass</a:t>
-            </a:r>
-            <a:r>
-              <a:rPr lang="en-US" baseline="0" dirty="0"/>
-              <a:t>). These have to match!</a:t>
-            </a:r>
-          </a:p>
-          <a:p>
-            <a:pPr marL="285750" marR="0" lvl="0" indent="-285750" algn="l" defTabSz="1088776" rtl="0" eaLnBrk="1" fontAlgn="auto" latinLnBrk="0" hangingPunct="1">
-              <a:lnSpc>
-                <a:spcPct val="100000"/>
-              </a:lnSpc>
-              <a:spcBef>
-                <a:spcPts val="0"/>
-              </a:spcBef>
-              <a:spcAft>
-                <a:spcPts val="0"/>
-              </a:spcAft>
-              <a:buClrTx/>
-              <a:buSzTx/>
-              <a:buFontTx/>
-              <a:buChar char="-"/>
-              <a:tabLst/>
-              <a:defRPr/>
-            </a:pPr>
-            <a:r>
-              <a:rPr lang="en-US" baseline="0" dirty="0"/>
-              <a:t>Query the PV’s and outline the connection between the PVC in the namespace and the PV. Print out the PV </a:t>
-            </a:r>
-            <a:r>
-              <a:rPr lang="en-US" baseline="0" dirty="0" err="1"/>
-              <a:t>yaml</a:t>
-            </a:r>
-            <a:r>
-              <a:rPr lang="en-US" baseline="0" dirty="0"/>
-              <a:t> and highlight that there is no namespace as PV resources are not </a:t>
-            </a:r>
-            <a:r>
-              <a:rPr lang="en-US" baseline="0" dirty="0" err="1"/>
-              <a:t>namespaced</a:t>
-            </a:r>
-            <a:r>
-              <a:rPr lang="en-US" baseline="0" dirty="0"/>
-              <a:t>.</a:t>
-            </a:r>
-          </a:p>
-          <a:p>
-            <a:pPr marL="285750" marR="0" lvl="0" indent="-285750" algn="l" defTabSz="1088776" rtl="0" eaLnBrk="1" fontAlgn="auto" latinLnBrk="0" hangingPunct="1">
-              <a:lnSpc>
-                <a:spcPct val="100000"/>
-              </a:lnSpc>
-              <a:spcBef>
-                <a:spcPts val="0"/>
-              </a:spcBef>
-              <a:spcAft>
-                <a:spcPts val="0"/>
-              </a:spcAft>
-              <a:buClrTx/>
-              <a:buSzTx/>
-              <a:buFontTx/>
-              <a:buChar char="-"/>
-              <a:tabLst/>
-              <a:defRPr/>
-            </a:pPr>
-            <a:endParaRPr lang="en-US" baseline="0" dirty="0"/>
-          </a:p>
-          <a:p>
-            <a:pPr marL="285750" marR="0" lvl="0" indent="-285750" algn="l" defTabSz="1088776" rtl="0" eaLnBrk="1" fontAlgn="auto" latinLnBrk="0" hangingPunct="1">
-              <a:lnSpc>
-                <a:spcPct val="100000"/>
-              </a:lnSpc>
-              <a:spcBef>
-                <a:spcPts val="0"/>
-              </a:spcBef>
-              <a:spcAft>
-                <a:spcPts val="0"/>
-              </a:spcAft>
-              <a:buClrTx/>
-              <a:buSzTx/>
-              <a:buFontTx/>
-              <a:buChar char="-"/>
-              <a:tabLst/>
-              <a:defRPr/>
-            </a:pPr>
-            <a:r>
-              <a:rPr lang="en-US" baseline="0" dirty="0"/>
-              <a:t>Create a pod where the PVC is mounted. Discuss the volume &amp; </a:t>
-            </a:r>
-            <a:r>
-              <a:rPr lang="en-US" baseline="0" dirty="0" err="1"/>
-              <a:t>volumeMount</a:t>
-            </a:r>
-            <a:r>
-              <a:rPr lang="en-US" baseline="0" dirty="0"/>
-              <a:t> section and highlight the matching names for the volume within the pod spec to make it referenceable.</a:t>
-            </a:r>
-          </a:p>
-          <a:p>
-            <a:pPr marL="285750" marR="0" lvl="0" indent="-285750" algn="l" defTabSz="1088776" rtl="0" eaLnBrk="1" fontAlgn="auto" latinLnBrk="0" hangingPunct="1">
-              <a:lnSpc>
-                <a:spcPct val="100000"/>
-              </a:lnSpc>
-              <a:spcBef>
-                <a:spcPts val="0"/>
-              </a:spcBef>
-              <a:spcAft>
-                <a:spcPts val="0"/>
-              </a:spcAft>
-              <a:buClrTx/>
-              <a:buSzTx/>
-              <a:buFontTx/>
-              <a:buChar char="-"/>
-              <a:tabLst/>
-              <a:defRPr/>
-            </a:pPr>
-            <a:r>
-              <a:rPr lang="en-US" baseline="0" dirty="0"/>
-              <a:t>Once the pod is created, logon to it and create some content.</a:t>
-            </a:r>
-          </a:p>
-          <a:p>
-            <a:pPr marL="285750" marR="0" lvl="0" indent="-285750" algn="l" defTabSz="1088776" rtl="0" eaLnBrk="1" fontAlgn="auto" latinLnBrk="0" hangingPunct="1">
-              <a:lnSpc>
-                <a:spcPct val="100000"/>
-              </a:lnSpc>
-              <a:spcBef>
-                <a:spcPts val="0"/>
-              </a:spcBef>
-              <a:spcAft>
-                <a:spcPts val="0"/>
-              </a:spcAft>
-              <a:buClrTx/>
-              <a:buSzTx/>
-              <a:buFontTx/>
-              <a:buChar char="-"/>
-              <a:tabLst/>
-              <a:defRPr/>
-            </a:pPr>
-            <a:r>
-              <a:rPr lang="en-US" baseline="0" dirty="0"/>
-              <a:t>In parallel, create </a:t>
-            </a:r>
-            <a:r>
-              <a:rPr lang="en-US" baseline="0"/>
-              <a:t>a deployment </a:t>
-            </a:r>
-            <a:r>
-              <a:rPr lang="en-US" baseline="0" dirty="0"/>
-              <a:t>that attempts to mount the same PVC. </a:t>
-            </a:r>
-          </a:p>
-          <a:p>
-            <a:pPr marL="465750" marR="0" lvl="1" indent="-285750" algn="l" defTabSz="1088776" rtl="0" eaLnBrk="1" fontAlgn="auto" latinLnBrk="0" hangingPunct="1">
-              <a:lnSpc>
-                <a:spcPct val="100000"/>
-              </a:lnSpc>
-              <a:spcBef>
-                <a:spcPts val="0"/>
-              </a:spcBef>
-              <a:spcAft>
-                <a:spcPts val="0"/>
-              </a:spcAft>
-              <a:buClrTx/>
-              <a:buSzTx/>
-              <a:buFontTx/>
-              <a:buChar char="-"/>
-              <a:tabLst/>
-              <a:defRPr/>
-            </a:pPr>
-            <a:r>
-              <a:rPr lang="en-US" baseline="0" dirty="0"/>
-              <a:t>Discuss the error message (</a:t>
-            </a:r>
-            <a:r>
-              <a:rPr lang="en-US" baseline="0" dirty="0" err="1"/>
-              <a:t>kubectl</a:t>
-            </a:r>
-            <a:r>
-              <a:rPr lang="en-US" baseline="0" dirty="0"/>
-              <a:t> describe pod &lt;pod of a deployment&gt;)</a:t>
-            </a:r>
-          </a:p>
-          <a:p>
-            <a:pPr marL="465750" marR="0" lvl="1" indent="-285750" algn="l" defTabSz="1088776" rtl="0" eaLnBrk="1" fontAlgn="auto" latinLnBrk="0" hangingPunct="1">
-              <a:lnSpc>
-                <a:spcPct val="100000"/>
-              </a:lnSpc>
-              <a:spcBef>
-                <a:spcPts val="0"/>
-              </a:spcBef>
-              <a:spcAft>
-                <a:spcPts val="0"/>
-              </a:spcAft>
-              <a:buClrTx/>
-              <a:buSzTx/>
-              <a:buFontTx/>
-              <a:buChar char="-"/>
-              <a:tabLst/>
-              <a:defRPr/>
-            </a:pPr>
-            <a:r>
-              <a:rPr lang="en-US" baseline="0" dirty="0"/>
-              <a:t>Outline the implication of the access-mode. If the PVC is already bound once in RWO mode, it cannot be bound in any other mode. </a:t>
-            </a:r>
-          </a:p>
-          <a:p>
-            <a:pPr marL="465750" marR="0" lvl="1" indent="-285750" algn="l" defTabSz="1088776" rtl="0" eaLnBrk="1" fontAlgn="auto" latinLnBrk="0" hangingPunct="1">
-              <a:lnSpc>
-                <a:spcPct val="100000"/>
-              </a:lnSpc>
-              <a:spcBef>
-                <a:spcPts val="0"/>
-              </a:spcBef>
-              <a:spcAft>
-                <a:spcPts val="0"/>
-              </a:spcAft>
-              <a:buClrTx/>
-              <a:buSzTx/>
-              <a:buFontTx/>
-              <a:buChar char="-"/>
-              <a:tabLst/>
-              <a:defRPr/>
-            </a:pPr>
-            <a:r>
-              <a:rPr lang="en-US" baseline="0" dirty="0"/>
-              <a:t>To get the example working the first pod would need to be removed and all other pods would  need to be re-created.</a:t>
+            <a:r>
+              <a:rPr lang="en-US" dirty="0"/>
+              <a:t>https://kubernetes.io/docs/concepts/storage/persistent-volumes/#types-of-persistent-volumes</a:t>
+            </a:r>
+          </a:p>
+          <a:p>
+            <a:endParaRPr lang="en-US" dirty="0"/>
+          </a:p>
+          <a:p>
+            <a:r>
+              <a:rPr lang="en-US" dirty="0"/>
+              <a:t>https://kubernetes.io/docs/concepts/storage/persistent-volumes/#access-modes</a:t>
             </a:r>
           </a:p>
         </p:txBody>
@@ -1607,7 +1354,7 @@
     </p:spTree>
     <p:extLst>
       <p:ext uri="{BB962C8B-B14F-4D97-AF65-F5344CB8AC3E}">
-        <p14:creationId xmlns:p14="http://schemas.microsoft.com/office/powerpoint/2010/main" val="830541180"/>
+        <p14:creationId xmlns:p14="http://schemas.microsoft.com/office/powerpoint/2010/main" val="3695363802"/>
       </p:ext>
     </p:extLst>
   </p:cSld>
@@ -1661,15 +1408,299 @@
           <a:bodyPr/>
           <a:lstStyle/>
           <a:p>
-            <a:r>
-              <a:rPr lang="en-US" dirty="0"/>
-              <a:t>1 PV is always bound by exactly 1 PVC. There is no real order but Kubernetes tries to create matches between requested and provisioned size.</a:t>
-            </a:r>
-          </a:p>
-          <a:p>
-            <a:r>
-              <a:rPr lang="en-US" dirty="0"/>
-              <a:t>Problem: the match making is based on “equals or greater”. So if the PVC requests 1GB but there is only one PVC with 50GB available, it will be bound nevertheless (and “waste” 49GB)</a:t>
+            <a:pPr marL="285750" marR="0" lvl="0" indent="-285750" algn="l" defTabSz="1088776" rtl="0" eaLnBrk="1" fontAlgn="auto" latinLnBrk="0" hangingPunct="1">
+              <a:lnSpc>
+                <a:spcPct val="100000"/>
+              </a:lnSpc>
+              <a:spcBef>
+                <a:spcPts val="0"/>
+              </a:spcBef>
+              <a:spcAft>
+                <a:spcPts val="0"/>
+              </a:spcAft>
+              <a:buClrTx/>
+              <a:buSzTx/>
+              <a:buFontTx/>
+              <a:buChar char="-"/>
+              <a:tabLst/>
+              <a:defRPr/>
+            </a:pPr>
+            <a:r>
+              <a:rPr lang="en-US" baseline="0" dirty="0"/>
+              <a:t>Create a PVC from </a:t>
+            </a:r>
+            <a:r>
+              <a:rPr lang="en-US" baseline="0" dirty="0" err="1"/>
+              <a:t>yaml</a:t>
+            </a:r>
+            <a:endParaRPr lang="en-US" baseline="0" dirty="0"/>
+          </a:p>
+          <a:p>
+            <a:pPr marL="285750" marR="0" lvl="0" indent="-285750" algn="l" defTabSz="1088776" rtl="0" eaLnBrk="1" fontAlgn="auto" latinLnBrk="0" hangingPunct="1">
+              <a:lnSpc>
+                <a:spcPct val="100000"/>
+              </a:lnSpc>
+              <a:spcBef>
+                <a:spcPts val="0"/>
+              </a:spcBef>
+              <a:spcAft>
+                <a:spcPts val="0"/>
+              </a:spcAft>
+              <a:buClrTx/>
+              <a:buSzTx/>
+              <a:buFontTx/>
+              <a:buChar char="-"/>
+              <a:tabLst/>
+              <a:defRPr/>
+            </a:pPr>
+            <a:r>
+              <a:rPr lang="en-US" baseline="0" dirty="0"/>
+              <a:t>Show the storage class reference in the PVC </a:t>
+            </a:r>
+            <a:r>
+              <a:rPr lang="en-US" baseline="0" dirty="0" err="1"/>
+              <a:t>yaml</a:t>
+            </a:r>
+            <a:r>
+              <a:rPr lang="en-US" baseline="0" dirty="0"/>
+              <a:t> and the corresponding storage class within the cluster (</a:t>
+            </a:r>
+            <a:r>
+              <a:rPr lang="en-US" baseline="0" dirty="0" err="1"/>
+              <a:t>kubectl</a:t>
+            </a:r>
+            <a:r>
+              <a:rPr lang="en-US" baseline="0" dirty="0"/>
+              <a:t> get </a:t>
+            </a:r>
+            <a:r>
+              <a:rPr lang="en-US" baseline="0" dirty="0" err="1"/>
+              <a:t>storageclass</a:t>
+            </a:r>
+            <a:r>
+              <a:rPr lang="en-US" baseline="0" dirty="0"/>
+              <a:t>). These have to match!</a:t>
+            </a:r>
+          </a:p>
+          <a:p>
+            <a:pPr marL="285750" marR="0" lvl="0" indent="-285750" algn="l" defTabSz="1088776" rtl="0" eaLnBrk="1" fontAlgn="auto" latinLnBrk="0" hangingPunct="1">
+              <a:lnSpc>
+                <a:spcPct val="100000"/>
+              </a:lnSpc>
+              <a:spcBef>
+                <a:spcPts val="0"/>
+              </a:spcBef>
+              <a:spcAft>
+                <a:spcPts val="0"/>
+              </a:spcAft>
+              <a:buClrTx/>
+              <a:buSzTx/>
+              <a:buFontTx/>
+              <a:buChar char="-"/>
+              <a:tabLst/>
+              <a:defRPr/>
+            </a:pPr>
+            <a:r>
+              <a:rPr lang="en-US" baseline="0" dirty="0"/>
+              <a:t>Query the PV’s and outline the connection between the PVC in the namespace and the PV. Print out the PV </a:t>
+            </a:r>
+            <a:r>
+              <a:rPr lang="en-US" baseline="0" dirty="0" err="1"/>
+              <a:t>yaml</a:t>
+            </a:r>
+            <a:r>
+              <a:rPr lang="en-US" baseline="0" dirty="0"/>
+              <a:t> and highlight that there is no namespace as PV resources are not </a:t>
+            </a:r>
+            <a:r>
+              <a:rPr lang="en-US" baseline="0" dirty="0" err="1"/>
+              <a:t>namespaced</a:t>
+            </a:r>
+            <a:r>
+              <a:rPr lang="en-US" baseline="0" dirty="0"/>
+              <a:t>.</a:t>
+            </a:r>
+          </a:p>
+          <a:p>
+            <a:pPr marL="285750" marR="0" lvl="0" indent="-285750" algn="l" defTabSz="1088776" rtl="0" eaLnBrk="1" fontAlgn="auto" latinLnBrk="0" hangingPunct="1">
+              <a:lnSpc>
+                <a:spcPct val="100000"/>
+              </a:lnSpc>
+              <a:spcBef>
+                <a:spcPts val="0"/>
+              </a:spcBef>
+              <a:spcAft>
+                <a:spcPts val="0"/>
+              </a:spcAft>
+              <a:buClrTx/>
+              <a:buSzTx/>
+              <a:buFontTx/>
+              <a:buChar char="-"/>
+              <a:tabLst/>
+              <a:defRPr/>
+            </a:pPr>
+            <a:endParaRPr lang="en-US" baseline="0" dirty="0"/>
+          </a:p>
+          <a:p>
+            <a:pPr marL="285750" marR="0" lvl="0" indent="-285750" algn="l" defTabSz="1088776" rtl="0" eaLnBrk="1" fontAlgn="auto" latinLnBrk="0" hangingPunct="1">
+              <a:lnSpc>
+                <a:spcPct val="100000"/>
+              </a:lnSpc>
+              <a:spcBef>
+                <a:spcPts val="0"/>
+              </a:spcBef>
+              <a:spcAft>
+                <a:spcPts val="0"/>
+              </a:spcAft>
+              <a:buClrTx/>
+              <a:buSzTx/>
+              <a:buFontTx/>
+              <a:buChar char="-"/>
+              <a:tabLst/>
+              <a:defRPr/>
+            </a:pPr>
+            <a:r>
+              <a:rPr lang="en-US" baseline="0" dirty="0"/>
+              <a:t>Create a pod where the PVC is mounted. Discuss the volume &amp; </a:t>
+            </a:r>
+            <a:r>
+              <a:rPr lang="en-US" baseline="0" dirty="0" err="1"/>
+              <a:t>volumeMount</a:t>
+            </a:r>
+            <a:r>
+              <a:rPr lang="en-US" baseline="0" dirty="0"/>
+              <a:t> section and highlight the matching names for the volume within the pod spec to make it referenceable.</a:t>
+            </a:r>
+          </a:p>
+          <a:p>
+            <a:pPr marL="285750" marR="0" lvl="0" indent="-285750" algn="l" defTabSz="1088776" rtl="0" eaLnBrk="1" fontAlgn="auto" latinLnBrk="0" hangingPunct="1">
+              <a:lnSpc>
+                <a:spcPct val="100000"/>
+              </a:lnSpc>
+              <a:spcBef>
+                <a:spcPts val="0"/>
+              </a:spcBef>
+              <a:spcAft>
+                <a:spcPts val="0"/>
+              </a:spcAft>
+              <a:buClrTx/>
+              <a:buSzTx/>
+              <a:buFontTx/>
+              <a:buChar char="-"/>
+              <a:tabLst/>
+              <a:defRPr/>
+            </a:pPr>
+            <a:r>
+              <a:rPr lang="en-US" baseline="0" dirty="0"/>
+              <a:t>Once the pod is created, logon to it and create some content.</a:t>
+            </a:r>
+          </a:p>
+          <a:p>
+            <a:pPr marL="285750" marR="0" lvl="0" indent="-285750" algn="l" defTabSz="1088776" rtl="0" eaLnBrk="1" fontAlgn="auto" latinLnBrk="0" hangingPunct="1">
+              <a:lnSpc>
+                <a:spcPct val="100000"/>
+              </a:lnSpc>
+              <a:spcBef>
+                <a:spcPts val="0"/>
+              </a:spcBef>
+              <a:spcAft>
+                <a:spcPts val="0"/>
+              </a:spcAft>
+              <a:buClrTx/>
+              <a:buSzTx/>
+              <a:buFontTx/>
+              <a:buChar char="-"/>
+              <a:tabLst/>
+              <a:defRPr/>
+            </a:pPr>
+            <a:r>
+              <a:rPr lang="en-US" baseline="0" dirty="0"/>
+              <a:t>In parallel, create </a:t>
+            </a:r>
+            <a:r>
+              <a:rPr lang="en-US" baseline="0"/>
+              <a:t>a deployment </a:t>
+            </a:r>
+            <a:r>
+              <a:rPr lang="en-US" baseline="0" dirty="0"/>
+              <a:t>that attempts to mount the same PVC. </a:t>
+            </a:r>
+          </a:p>
+          <a:p>
+            <a:pPr marL="465750" marR="0" lvl="1" indent="-285750" algn="l" defTabSz="1088776" rtl="0" eaLnBrk="1" fontAlgn="auto" latinLnBrk="0" hangingPunct="1">
+              <a:lnSpc>
+                <a:spcPct val="100000"/>
+              </a:lnSpc>
+              <a:spcBef>
+                <a:spcPts val="0"/>
+              </a:spcBef>
+              <a:spcAft>
+                <a:spcPts val="0"/>
+              </a:spcAft>
+              <a:buClrTx/>
+              <a:buSzTx/>
+              <a:buFontTx/>
+              <a:buChar char="-"/>
+              <a:tabLst/>
+              <a:defRPr/>
+            </a:pPr>
+            <a:r>
+              <a:rPr lang="en-US" baseline="0" dirty="0"/>
+              <a:t>Discuss the error message (</a:t>
+            </a:r>
+            <a:r>
+              <a:rPr lang="en-US" baseline="0" dirty="0" err="1"/>
+              <a:t>kubectl</a:t>
+            </a:r>
+            <a:r>
+              <a:rPr lang="en-US" baseline="0" dirty="0"/>
+              <a:t> describe pod &lt;pod of a deployment&gt;)</a:t>
+            </a:r>
+          </a:p>
+          <a:p>
+            <a:pPr marL="465750" marR="0" lvl="1" indent="-285750" algn="l" defTabSz="1088776" rtl="0" eaLnBrk="1" fontAlgn="auto" latinLnBrk="0" hangingPunct="1">
+              <a:lnSpc>
+                <a:spcPct val="100000"/>
+              </a:lnSpc>
+              <a:spcBef>
+                <a:spcPts val="0"/>
+              </a:spcBef>
+              <a:spcAft>
+                <a:spcPts val="0"/>
+              </a:spcAft>
+              <a:buClrTx/>
+              <a:buSzTx/>
+              <a:buFontTx/>
+              <a:buChar char="-"/>
+              <a:tabLst/>
+              <a:defRPr/>
+            </a:pPr>
+            <a:r>
+              <a:rPr lang="en-US" baseline="0" dirty="0"/>
+              <a:t>Outline the implication of the access-mode. If the PVC is already bound once in RWO mode, it cannot be bound in any other mode. </a:t>
+            </a:r>
+          </a:p>
+          <a:p>
+            <a:pPr marL="465750" marR="0" lvl="1" indent="-285750" algn="l" defTabSz="1088776" rtl="0" eaLnBrk="1" fontAlgn="auto" latinLnBrk="0" hangingPunct="1">
+              <a:lnSpc>
+                <a:spcPct val="100000"/>
+              </a:lnSpc>
+              <a:spcBef>
+                <a:spcPts val="0"/>
+              </a:spcBef>
+              <a:spcAft>
+                <a:spcPts val="0"/>
+              </a:spcAft>
+              <a:buClrTx/>
+              <a:buSzTx/>
+              <a:buFontTx/>
+              <a:buChar char="-"/>
+              <a:tabLst/>
+              <a:defRPr/>
+            </a:pPr>
+            <a:r>
+              <a:rPr lang="en-US" baseline="0" dirty="0"/>
+              <a:t>To get the example working the first pod would need to be removed and all other pods would  need to be re-created.</a:t>
             </a:r>
           </a:p>
         </p:txBody>
@@ -1690,9 +1721,103 @@
           <a:lstStyle/>
           <a:p>
             <a:fld id="{7D8C2C35-2B8A-446E-BEC0-FD36716C29AC}" type="slidenum">
+              <a:rPr lang="de-DE" smtClean="0"/>
+              <a:pPr/>
+              <a:t>17</a:t>
+            </a:fld>
+            <a:endParaRPr lang="de-DE" dirty="0"/>
+          </a:p>
+        </p:txBody>
+      </p:sp>
+    </p:spTree>
+    <p:extLst>
+      <p:ext uri="{BB962C8B-B14F-4D97-AF65-F5344CB8AC3E}">
+        <p14:creationId xmlns:p14="http://schemas.microsoft.com/office/powerpoint/2010/main" val="830541180"/>
+      </p:ext>
+    </p:extLst>
+  </p:cSld>
+  <p:clrMapOvr>
+    <a:masterClrMapping/>
+  </p:clrMapOvr>
+</p:notes>
+</file>
+
+<file path=ppt/notesSlides/notesSlide18.xml><?xml version="1.0" encoding="utf-8"?>
+<p:notes xmlns:a="http://schemas.openxmlformats.org/drawingml/2006/main" xmlns:r="http://schemas.openxmlformats.org/officeDocument/2006/relationships" xmlns:p="http://schemas.openxmlformats.org/presentationml/2006/main">
+  <p:cSld>
+    <p:spTree>
+      <p:nvGrpSpPr>
+        <p:cNvPr id="1" name=""/>
+        <p:cNvGrpSpPr/>
+        <p:nvPr/>
+      </p:nvGrpSpPr>
+      <p:grpSpPr>
+        <a:xfrm>
+          <a:off x="0" y="0"/>
+          <a:ext cx="0" cy="0"/>
+          <a:chOff x="0" y="0"/>
+          <a:chExt cx="0" cy="0"/>
+        </a:xfrm>
+      </p:grpSpPr>
+      <p:sp>
+        <p:nvSpPr>
+          <p:cNvPr id="2" name="Slide Image Placeholder 1"/>
+          <p:cNvSpPr>
+            <a:spLocks noGrp="1" noRot="1" noChangeAspect="1"/>
+          </p:cNvSpPr>
+          <p:nvPr>
+            <p:ph type="sldImg"/>
+          </p:nvPr>
+        </p:nvSpPr>
+        <p:spPr/>
+      </p:sp>
+      <p:sp>
+        <p:nvSpPr>
+          <p:cNvPr id="3" name="Notes Placeholder 2"/>
+          <p:cNvSpPr>
+            <a:spLocks noGrp="1"/>
+          </p:cNvSpPr>
+          <p:nvPr>
+            <p:ph type="body" idx="1"/>
+          </p:nvPr>
+        </p:nvSpPr>
+        <p:spPr/>
+        <p:txBody>
+          <a:bodyPr/>
+          <a:lstStyle/>
+          <a:p>
+            <a:r>
+              <a:rPr lang="en-US" dirty="0"/>
+              <a:t>1 PV is always bound by exactly 1 PVC. There is no real order but Kubernetes tries to create matches between requested and provisioned size.</a:t>
+            </a:r>
+          </a:p>
+          <a:p>
+            <a:r>
+              <a:rPr lang="en-US" dirty="0"/>
+              <a:t>Problem: the match making is based on “equals or greater”. So if the PVC requests 1GB but there is only one PVC with 50GB available, it will be bound nevertheless (and “waste” 49GB)</a:t>
+            </a:r>
+          </a:p>
+        </p:txBody>
+      </p:sp>
+      <p:sp>
+        <p:nvSpPr>
+          <p:cNvPr id="4" name="Slide Number Placeholder 3"/>
+          <p:cNvSpPr>
+            <a:spLocks noGrp="1"/>
+          </p:cNvSpPr>
+          <p:nvPr>
+            <p:ph type="sldNum" sz="quarter" idx="10"/>
+          </p:nvPr>
+        </p:nvSpPr>
+        <p:spPr/>
+        <p:txBody>
+          <a:bodyPr/>
+          <a:lstStyle/>
+          <a:p>
+            <a:fld id="{7D8C2C35-2B8A-446E-BEC0-FD36716C29AC}" type="slidenum">
               <a:rPr lang="en-US" smtClean="0"/>
               <a:pPr/>
-              <a:t>18</a:t>
+              <a:t>19</a:t>
             </a:fld>
             <a:endParaRPr lang="en-US" dirty="0"/>
           </a:p>
@@ -1711,7 +1836,7 @@
 </p:notes>
 </file>
 
-<file path=ppt/notesSlides/notesSlide18.xml><?xml version="1.0" encoding="utf-8"?>
+<file path=ppt/notesSlides/notesSlide19.xml><?xml version="1.0" encoding="utf-8"?>
 <p:notes xmlns:a="http://schemas.openxmlformats.org/drawingml/2006/main" xmlns:r="http://schemas.openxmlformats.org/officeDocument/2006/relationships" xmlns:p="http://schemas.openxmlformats.org/presentationml/2006/main">
   <p:cSld>
     <p:spTree>
@@ -1746,7 +1871,7 @@
             <a:fld id="{7D8C2C35-2B8A-446E-BEC0-FD36716C29AC}" type="slidenum">
               <a:rPr lang="en-US" smtClean="0"/>
               <a:pPr/>
-              <a:t>19</a:t>
+              <a:t>20</a:t>
             </a:fld>
             <a:endParaRPr lang="en-US" dirty="0"/>
           </a:p>
@@ -19501,6 +19626,1991 @@
       </p:grpSpPr>
       <p:sp>
         <p:nvSpPr>
+          <p:cNvPr id="2" name="Title 1">
+            <a:extLst>
+              <a:ext uri="{FF2B5EF4-FFF2-40B4-BE49-F238E27FC236}">
+                <a16:creationId xmlns:a16="http://schemas.microsoft.com/office/drawing/2014/main" id="{D4C30A85-2277-4AED-93CC-D455D481D551}"/>
+              </a:ext>
+            </a:extLst>
+          </p:cNvPr>
+          <p:cNvSpPr>
+            <a:spLocks noGrp="1"/>
+          </p:cNvSpPr>
+          <p:nvPr>
+            <p:ph type="title"/>
+          </p:nvPr>
+        </p:nvSpPr>
+        <p:spPr>
+          <a:xfrm>
+            <a:off x="504001" y="504000"/>
+            <a:ext cx="11186476" cy="369332"/>
+          </a:xfrm>
+        </p:spPr>
+        <p:txBody>
+          <a:bodyPr/>
+          <a:lstStyle/>
+          <a:p>
+            <a:r>
+              <a:rPr lang="en-US" dirty="0"/>
+              <a:t>PV/PVC lifecycle</a:t>
+            </a:r>
+          </a:p>
+        </p:txBody>
+      </p:sp>
+      <p:cxnSp>
+        <p:nvCxnSpPr>
+          <p:cNvPr id="7" name="Straight Arrow Connector 6">
+            <a:extLst>
+              <a:ext uri="{FF2B5EF4-FFF2-40B4-BE49-F238E27FC236}">
+                <a16:creationId xmlns:a16="http://schemas.microsoft.com/office/drawing/2014/main" id="{0E148E64-5823-42DF-8A18-A33E61E0BD6C}"/>
+              </a:ext>
+            </a:extLst>
+          </p:cNvPr>
+          <p:cNvCxnSpPr>
+            <a:cxnSpLocks/>
+            <a:stCxn id="13" idx="0"/>
+            <a:endCxn id="19" idx="1"/>
+          </p:cNvCxnSpPr>
+          <p:nvPr/>
+        </p:nvCxnSpPr>
+        <p:spPr>
+          <a:xfrm flipV="1">
+            <a:off x="2605824" y="3429000"/>
+            <a:ext cx="806808" cy="1"/>
+          </a:xfrm>
+          <a:prstGeom prst="straightConnector1">
+            <a:avLst/>
+          </a:prstGeom>
+          <a:ln w="57150">
+            <a:solidFill>
+              <a:schemeClr val="tx1"/>
+            </a:solidFill>
+            <a:headEnd type="none" w="med" len="med"/>
+            <a:tailEnd type="triangle"/>
+          </a:ln>
+        </p:spPr>
+        <p:style>
+          <a:lnRef idx="1">
+            <a:schemeClr val="accent1"/>
+          </a:lnRef>
+          <a:fillRef idx="0">
+            <a:schemeClr val="accent1"/>
+          </a:fillRef>
+          <a:effectRef idx="0">
+            <a:schemeClr val="accent1"/>
+          </a:effectRef>
+          <a:fontRef idx="minor">
+            <a:schemeClr val="tx1"/>
+          </a:fontRef>
+        </p:style>
+      </p:cxnSp>
+      <p:sp>
+        <p:nvSpPr>
+          <p:cNvPr id="13" name="Rectangle: Diagonal Corners Rounded 12">
+            <a:extLst>
+              <a:ext uri="{FF2B5EF4-FFF2-40B4-BE49-F238E27FC236}">
+                <a16:creationId xmlns:a16="http://schemas.microsoft.com/office/drawing/2014/main" id="{16A03595-0330-4635-9435-4D1CD393120F}"/>
+              </a:ext>
+            </a:extLst>
+          </p:cNvPr>
+          <p:cNvSpPr/>
+          <p:nvPr/>
+        </p:nvSpPr>
+        <p:spPr bwMode="gray">
+          <a:xfrm>
+            <a:off x="802171" y="2872884"/>
+            <a:ext cx="1803653" cy="1112233"/>
+          </a:xfrm>
+          <a:prstGeom prst="round2DiagRect">
+            <a:avLst/>
+          </a:prstGeom>
+          <a:ln>
+            <a:headEnd/>
+            <a:tailEnd/>
+          </a:ln>
+        </p:spPr>
+        <p:style>
+          <a:lnRef idx="2">
+            <a:schemeClr val="accent2"/>
+          </a:lnRef>
+          <a:fillRef idx="1">
+            <a:schemeClr val="lt1"/>
+          </a:fillRef>
+          <a:effectRef idx="0">
+            <a:schemeClr val="accent2"/>
+          </a:effectRef>
+          <a:fontRef idx="minor">
+            <a:schemeClr val="dk1"/>
+          </a:fontRef>
+        </p:style>
+        <p:txBody>
+          <a:bodyPr lIns="90000" tIns="72000" rIns="90000" bIns="72000" rtlCol="0" anchor="ctr"/>
+          <a:lstStyle/>
+          <a:p>
+            <a:pPr algn="ctr" defTabSz="914400" fontAlgn="base">
+              <a:spcBef>
+                <a:spcPct val="50000"/>
+              </a:spcBef>
+              <a:spcAft>
+                <a:spcPct val="0"/>
+              </a:spcAft>
+              <a:buClr>
+                <a:srgbClr val="F0AB00"/>
+              </a:buClr>
+              <a:buSzPct val="80000"/>
+            </a:pPr>
+            <a:r>
+              <a:rPr lang="en-US" sz="1800" kern="0" dirty="0">
+                <a:solidFill>
+                  <a:schemeClr val="dk1"/>
+                </a:solidFill>
+                <a:latin typeface="+mn-lt"/>
+                <a:ea typeface="Arial Unicode MS" pitchFamily="34" charset="-128"/>
+                <a:cs typeface="Arial Unicode MS" pitchFamily="34" charset="-128"/>
+              </a:rPr>
+              <a:t>Persistent Volume Claim</a:t>
+            </a:r>
+          </a:p>
+        </p:txBody>
+      </p:sp>
+      <p:sp>
+        <p:nvSpPr>
+          <p:cNvPr id="18" name="Speech Bubble: Rectangle 17">
+            <a:extLst>
+              <a:ext uri="{FF2B5EF4-FFF2-40B4-BE49-F238E27FC236}">
+                <a16:creationId xmlns:a16="http://schemas.microsoft.com/office/drawing/2014/main" id="{F53315F5-5393-42ED-AA74-A5CB6AC0C466}"/>
+              </a:ext>
+            </a:extLst>
+          </p:cNvPr>
+          <p:cNvSpPr/>
+          <p:nvPr/>
+        </p:nvSpPr>
+        <p:spPr bwMode="gray">
+          <a:xfrm>
+            <a:off x="1175928" y="1165881"/>
+            <a:ext cx="2535294" cy="915844"/>
+          </a:xfrm>
+          <a:prstGeom prst="wedgeRectCallout">
+            <a:avLst>
+              <a:gd name="adj1" fmla="val -31361"/>
+              <a:gd name="adj2" fmla="val 117470"/>
+            </a:avLst>
+          </a:prstGeom>
+          <a:ln>
+            <a:headEnd/>
+            <a:tailEnd/>
+          </a:ln>
+        </p:spPr>
+        <p:style>
+          <a:lnRef idx="2">
+            <a:schemeClr val="accent5"/>
+          </a:lnRef>
+          <a:fillRef idx="1">
+            <a:schemeClr val="lt1"/>
+          </a:fillRef>
+          <a:effectRef idx="0">
+            <a:schemeClr val="accent5"/>
+          </a:effectRef>
+          <a:fontRef idx="minor">
+            <a:schemeClr val="dk1"/>
+          </a:fontRef>
+        </p:style>
+        <p:txBody>
+          <a:bodyPr lIns="90000" tIns="72000" rIns="90000" bIns="72000" rtlCol="0" anchor="ctr"/>
+          <a:lstStyle/>
+          <a:p>
+            <a:pPr marR="0" algn="ctr" defTabSz="914400" eaLnBrk="1" fontAlgn="base" latinLnBrk="0" hangingPunct="1">
+              <a:lnSpc>
+                <a:spcPct val="100000"/>
+              </a:lnSpc>
+              <a:spcBef>
+                <a:spcPct val="50000"/>
+              </a:spcBef>
+              <a:spcAft>
+                <a:spcPct val="0"/>
+              </a:spcAft>
+              <a:buClr>
+                <a:srgbClr val="F0AB00"/>
+              </a:buClr>
+              <a:buSzPct val="80000"/>
+              <a:tabLst/>
+            </a:pPr>
+            <a:r>
+              <a:rPr lang="en-US" sz="1800" kern="0" dirty="0">
+                <a:ea typeface="Arial Unicode MS" pitchFamily="34" charset="-128"/>
+                <a:cs typeface="Arial Unicode MS" pitchFamily="34" charset="-128"/>
+              </a:rPr>
+              <a:t>User creates a PVC to request storage</a:t>
+            </a:r>
+            <a:endParaRPr kumimoji="0" lang="en-US" sz="1800" b="0" i="0" u="none" strike="noStrike" kern="0" cap="none" spc="0" normalizeH="0" baseline="0" noProof="0" dirty="0" err="1">
+              <a:ln>
+                <a:noFill/>
+              </a:ln>
+              <a:effectLst/>
+              <a:uLnTx/>
+              <a:uFillTx/>
+              <a:ea typeface="Arial Unicode MS" pitchFamily="34" charset="-128"/>
+              <a:cs typeface="Arial Unicode MS" pitchFamily="34" charset="-128"/>
+            </a:endParaRPr>
+          </a:p>
+        </p:txBody>
+      </p:sp>
+      <p:sp>
+        <p:nvSpPr>
+          <p:cNvPr id="19" name="Diamond 18">
+            <a:extLst>
+              <a:ext uri="{FF2B5EF4-FFF2-40B4-BE49-F238E27FC236}">
+                <a16:creationId xmlns:a16="http://schemas.microsoft.com/office/drawing/2014/main" id="{9EE372CB-8F56-443C-9215-2DA0EC4B459A}"/>
+              </a:ext>
+            </a:extLst>
+          </p:cNvPr>
+          <p:cNvSpPr/>
+          <p:nvPr/>
+        </p:nvSpPr>
+        <p:spPr bwMode="gray">
+          <a:xfrm>
+            <a:off x="3412632" y="2667898"/>
+            <a:ext cx="1981071" cy="1522203"/>
+          </a:xfrm>
+          <a:prstGeom prst="diamond">
+            <a:avLst/>
+          </a:prstGeom>
+          <a:ln>
+            <a:headEnd/>
+            <a:tailEnd/>
+          </a:ln>
+        </p:spPr>
+        <p:style>
+          <a:lnRef idx="2">
+            <a:schemeClr val="accent2"/>
+          </a:lnRef>
+          <a:fillRef idx="1">
+            <a:schemeClr val="lt1"/>
+          </a:fillRef>
+          <a:effectRef idx="0">
+            <a:schemeClr val="accent2"/>
+          </a:effectRef>
+          <a:fontRef idx="minor">
+            <a:schemeClr val="dk1"/>
+          </a:fontRef>
+        </p:style>
+        <p:txBody>
+          <a:bodyPr lIns="90000" tIns="72000" rIns="90000" bIns="72000" rtlCol="0" anchor="ctr"/>
+          <a:lstStyle/>
+          <a:p>
+            <a:pPr algn="ctr" defTabSz="914400" fontAlgn="base">
+              <a:spcBef>
+                <a:spcPct val="50000"/>
+              </a:spcBef>
+              <a:spcAft>
+                <a:spcPct val="0"/>
+              </a:spcAft>
+              <a:buClr>
+                <a:srgbClr val="F0AB00"/>
+              </a:buClr>
+              <a:buSzPct val="80000"/>
+            </a:pPr>
+            <a:r>
+              <a:rPr lang="en-US" sz="1800" kern="0" dirty="0">
+                <a:solidFill>
+                  <a:schemeClr val="dk1"/>
+                </a:solidFill>
+                <a:latin typeface="+mn-lt"/>
+                <a:ea typeface="Arial Unicode MS" pitchFamily="34" charset="-128"/>
+                <a:cs typeface="Arial Unicode MS" pitchFamily="34" charset="-128"/>
+              </a:rPr>
+              <a:t>Storage Class</a:t>
+            </a:r>
+          </a:p>
+        </p:txBody>
+      </p:sp>
+      <p:sp>
+        <p:nvSpPr>
+          <p:cNvPr id="25" name="Speech Bubble: Rectangle 24">
+            <a:extLst>
+              <a:ext uri="{FF2B5EF4-FFF2-40B4-BE49-F238E27FC236}">
+                <a16:creationId xmlns:a16="http://schemas.microsoft.com/office/drawing/2014/main" id="{2C734FFF-558D-4925-8900-F101F47F1C1C}"/>
+              </a:ext>
+            </a:extLst>
+          </p:cNvPr>
+          <p:cNvSpPr/>
+          <p:nvPr/>
+        </p:nvSpPr>
+        <p:spPr bwMode="gray">
+          <a:xfrm>
+            <a:off x="1880267" y="5167406"/>
+            <a:ext cx="2826226" cy="915844"/>
+          </a:xfrm>
+          <a:prstGeom prst="wedgeRectCallout">
+            <a:avLst>
+              <a:gd name="adj1" fmla="val 33544"/>
+              <a:gd name="adj2" fmla="val -148415"/>
+            </a:avLst>
+          </a:prstGeom>
+          <a:ln>
+            <a:headEnd/>
+            <a:tailEnd/>
+          </a:ln>
+        </p:spPr>
+        <p:style>
+          <a:lnRef idx="2">
+            <a:schemeClr val="accent5"/>
+          </a:lnRef>
+          <a:fillRef idx="1">
+            <a:schemeClr val="lt1"/>
+          </a:fillRef>
+          <a:effectRef idx="0">
+            <a:schemeClr val="accent5"/>
+          </a:effectRef>
+          <a:fontRef idx="minor">
+            <a:schemeClr val="dk1"/>
+          </a:fontRef>
+        </p:style>
+        <p:txBody>
+          <a:bodyPr lIns="90000" tIns="72000" rIns="90000" bIns="72000" rtlCol="0" anchor="ctr"/>
+          <a:lstStyle/>
+          <a:p>
+            <a:pPr marR="0" algn="ctr" defTabSz="914400" eaLnBrk="1" fontAlgn="base" latinLnBrk="0" hangingPunct="1">
+              <a:lnSpc>
+                <a:spcPct val="100000"/>
+              </a:lnSpc>
+              <a:spcBef>
+                <a:spcPct val="50000"/>
+              </a:spcBef>
+              <a:spcAft>
+                <a:spcPct val="0"/>
+              </a:spcAft>
+              <a:buClr>
+                <a:srgbClr val="F0AB00"/>
+              </a:buClr>
+              <a:buSzPct val="80000"/>
+              <a:tabLst/>
+            </a:pPr>
+            <a:r>
+              <a:rPr lang="en-US" sz="1800" kern="0" dirty="0">
+                <a:ea typeface="Arial Unicode MS" pitchFamily="34" charset="-128"/>
+                <a:cs typeface="Arial Unicode MS" pitchFamily="34" charset="-128"/>
+              </a:rPr>
+              <a:t>Storage Class is triggered to fulfill request</a:t>
+            </a:r>
+            <a:endParaRPr kumimoji="0" lang="en-US" sz="1800" b="0" i="0" u="none" strike="noStrike" kern="0" cap="none" spc="0" normalizeH="0" baseline="0" noProof="0" dirty="0" err="1">
+              <a:ln>
+                <a:noFill/>
+              </a:ln>
+              <a:effectLst/>
+              <a:uLnTx/>
+              <a:uFillTx/>
+              <a:ea typeface="Arial Unicode MS" pitchFamily="34" charset="-128"/>
+              <a:cs typeface="Arial Unicode MS" pitchFamily="34" charset="-128"/>
+            </a:endParaRPr>
+          </a:p>
+        </p:txBody>
+      </p:sp>
+      <p:sp>
+        <p:nvSpPr>
+          <p:cNvPr id="26" name="Cylinder 25">
+            <a:extLst>
+              <a:ext uri="{FF2B5EF4-FFF2-40B4-BE49-F238E27FC236}">
+                <a16:creationId xmlns:a16="http://schemas.microsoft.com/office/drawing/2014/main" id="{0493B288-1ED8-4F28-8486-18B37A81CB6F}"/>
+              </a:ext>
+            </a:extLst>
+          </p:cNvPr>
+          <p:cNvSpPr/>
+          <p:nvPr/>
+        </p:nvSpPr>
+        <p:spPr bwMode="gray">
+          <a:xfrm>
+            <a:off x="6099203" y="4262755"/>
+            <a:ext cx="1693576" cy="1362573"/>
+          </a:xfrm>
+          <a:prstGeom prst="can">
+            <a:avLst/>
+          </a:prstGeom>
+          <a:ln>
+            <a:headEnd/>
+            <a:tailEnd/>
+          </a:ln>
+        </p:spPr>
+        <p:style>
+          <a:lnRef idx="2">
+            <a:schemeClr val="accent2"/>
+          </a:lnRef>
+          <a:fillRef idx="1">
+            <a:schemeClr val="lt1"/>
+          </a:fillRef>
+          <a:effectRef idx="0">
+            <a:schemeClr val="accent2"/>
+          </a:effectRef>
+          <a:fontRef idx="minor">
+            <a:schemeClr val="dk1"/>
+          </a:fontRef>
+        </p:style>
+        <p:txBody>
+          <a:bodyPr lIns="90000" tIns="72000" rIns="90000" bIns="72000" rtlCol="0" anchor="ctr"/>
+          <a:lstStyle/>
+          <a:p>
+            <a:pPr marR="0" algn="ctr" defTabSz="914400" eaLnBrk="1" fontAlgn="base" latinLnBrk="0" hangingPunct="1">
+              <a:lnSpc>
+                <a:spcPct val="100000"/>
+              </a:lnSpc>
+              <a:spcBef>
+                <a:spcPct val="50000"/>
+              </a:spcBef>
+              <a:spcAft>
+                <a:spcPct val="0"/>
+              </a:spcAft>
+              <a:buClr>
+                <a:srgbClr val="F0AB00"/>
+              </a:buClr>
+              <a:buSzPct val="80000"/>
+              <a:tabLst/>
+            </a:pPr>
+            <a:r>
+              <a:rPr kumimoji="0" lang="en-US" sz="1800" b="0" i="0" u="none" strike="noStrike" kern="0" cap="none" spc="0" normalizeH="0" baseline="0" noProof="0" dirty="0">
+                <a:ln>
+                  <a:noFill/>
+                </a:ln>
+                <a:effectLst/>
+                <a:uLnTx/>
+                <a:uFillTx/>
+                <a:ea typeface="Arial Unicode MS" pitchFamily="34" charset="-128"/>
+                <a:cs typeface="Arial Unicode MS" pitchFamily="34" charset="-128"/>
+              </a:rPr>
+              <a:t>Physical storage</a:t>
+            </a:r>
+          </a:p>
+        </p:txBody>
+      </p:sp>
+      <p:sp>
+        <p:nvSpPr>
+          <p:cNvPr id="27" name="Cylinder 26">
+            <a:extLst>
+              <a:ext uri="{FF2B5EF4-FFF2-40B4-BE49-F238E27FC236}">
+                <a16:creationId xmlns:a16="http://schemas.microsoft.com/office/drawing/2014/main" id="{E89A7678-F502-4E6F-95F2-BE9431FDE897}"/>
+              </a:ext>
+            </a:extLst>
+          </p:cNvPr>
+          <p:cNvSpPr/>
+          <p:nvPr/>
+        </p:nvSpPr>
+        <p:spPr bwMode="gray">
+          <a:xfrm>
+            <a:off x="6202746" y="2751601"/>
+            <a:ext cx="1486490" cy="1104455"/>
+          </a:xfrm>
+          <a:prstGeom prst="can">
+            <a:avLst/>
+          </a:prstGeom>
+          <a:ln>
+            <a:headEnd/>
+            <a:tailEnd/>
+          </a:ln>
+        </p:spPr>
+        <p:style>
+          <a:lnRef idx="2">
+            <a:schemeClr val="accent2"/>
+          </a:lnRef>
+          <a:fillRef idx="1">
+            <a:schemeClr val="lt1"/>
+          </a:fillRef>
+          <a:effectRef idx="0">
+            <a:schemeClr val="accent2"/>
+          </a:effectRef>
+          <a:fontRef idx="minor">
+            <a:schemeClr val="dk1"/>
+          </a:fontRef>
+        </p:style>
+        <p:txBody>
+          <a:bodyPr lIns="90000" tIns="72000" rIns="90000" bIns="72000" rtlCol="0" anchor="ctr"/>
+          <a:lstStyle/>
+          <a:p>
+            <a:pPr marR="0" algn="ctr" defTabSz="914400" eaLnBrk="1" fontAlgn="base" latinLnBrk="0" hangingPunct="1">
+              <a:lnSpc>
+                <a:spcPct val="100000"/>
+              </a:lnSpc>
+              <a:spcBef>
+                <a:spcPct val="50000"/>
+              </a:spcBef>
+              <a:spcAft>
+                <a:spcPct val="0"/>
+              </a:spcAft>
+              <a:buClr>
+                <a:srgbClr val="F0AB00"/>
+              </a:buClr>
+              <a:buSzPct val="80000"/>
+              <a:tabLst/>
+            </a:pPr>
+            <a:r>
+              <a:rPr kumimoji="0" lang="en-US" sz="1800" b="0" i="0" u="none" strike="noStrike" kern="0" cap="none" spc="0" normalizeH="0" baseline="0" noProof="0" dirty="0">
+                <a:ln>
+                  <a:noFill/>
+                </a:ln>
+                <a:effectLst/>
+                <a:uLnTx/>
+                <a:uFillTx/>
+                <a:ea typeface="Arial Unicode MS" pitchFamily="34" charset="-128"/>
+                <a:cs typeface="Arial Unicode MS" pitchFamily="34" charset="-128"/>
+              </a:rPr>
+              <a:t>Persistent</a:t>
+            </a:r>
+            <a:r>
+              <a:rPr kumimoji="0" lang="en-US" sz="1800" b="0" i="0" u="none" strike="noStrike" kern="0" cap="none" spc="0" normalizeH="0" noProof="0" dirty="0">
+                <a:ln>
+                  <a:noFill/>
+                </a:ln>
+                <a:effectLst/>
+                <a:uLnTx/>
+                <a:uFillTx/>
+                <a:ea typeface="Arial Unicode MS" pitchFamily="34" charset="-128"/>
+                <a:cs typeface="Arial Unicode MS" pitchFamily="34" charset="-128"/>
+              </a:rPr>
+              <a:t> Volume</a:t>
+            </a:r>
+            <a:endParaRPr kumimoji="0" lang="en-US" sz="1800" b="0" i="0" u="none" strike="noStrike" kern="0" cap="none" spc="0" normalizeH="0" baseline="0" noProof="0" dirty="0">
+              <a:ln>
+                <a:noFill/>
+              </a:ln>
+              <a:effectLst/>
+              <a:uLnTx/>
+              <a:uFillTx/>
+              <a:ea typeface="Arial Unicode MS" pitchFamily="34" charset="-128"/>
+              <a:cs typeface="Arial Unicode MS" pitchFamily="34" charset="-128"/>
+            </a:endParaRPr>
+          </a:p>
+        </p:txBody>
+      </p:sp>
+      <p:cxnSp>
+        <p:nvCxnSpPr>
+          <p:cNvPr id="33" name="Straight Connector 32">
+            <a:extLst>
+              <a:ext uri="{FF2B5EF4-FFF2-40B4-BE49-F238E27FC236}">
+                <a16:creationId xmlns:a16="http://schemas.microsoft.com/office/drawing/2014/main" id="{C78407CA-CD3F-460D-924D-DE2C75E8F10A}"/>
+              </a:ext>
+            </a:extLst>
+          </p:cNvPr>
+          <p:cNvCxnSpPr>
+            <a:cxnSpLocks/>
+            <a:stCxn id="26" idx="1"/>
+            <a:endCxn id="27" idx="3"/>
+          </p:cNvCxnSpPr>
+          <p:nvPr/>
+        </p:nvCxnSpPr>
+        <p:spPr>
+          <a:xfrm flipV="1">
+            <a:off x="6945991" y="3856056"/>
+            <a:ext cx="0" cy="406699"/>
+          </a:xfrm>
+          <a:prstGeom prst="line">
+            <a:avLst/>
+          </a:prstGeom>
+          <a:ln w="57150">
+            <a:solidFill>
+              <a:schemeClr val="tx1"/>
+            </a:solidFill>
+            <a:headEnd type="none" w="med" len="med"/>
+            <a:tailEnd type="none" w="med" len="med"/>
+          </a:ln>
+        </p:spPr>
+        <p:style>
+          <a:lnRef idx="1">
+            <a:schemeClr val="accent1"/>
+          </a:lnRef>
+          <a:fillRef idx="0">
+            <a:schemeClr val="accent1"/>
+          </a:fillRef>
+          <a:effectRef idx="0">
+            <a:schemeClr val="accent1"/>
+          </a:effectRef>
+          <a:fontRef idx="minor">
+            <a:schemeClr val="tx1"/>
+          </a:fontRef>
+        </p:style>
+      </p:cxnSp>
+      <p:cxnSp>
+        <p:nvCxnSpPr>
+          <p:cNvPr id="36" name="Straight Arrow Connector 35">
+            <a:extLst>
+              <a:ext uri="{FF2B5EF4-FFF2-40B4-BE49-F238E27FC236}">
+                <a16:creationId xmlns:a16="http://schemas.microsoft.com/office/drawing/2014/main" id="{9FC7C8D8-9A9A-4230-B77C-140CCF1AD044}"/>
+              </a:ext>
+            </a:extLst>
+          </p:cNvPr>
+          <p:cNvCxnSpPr>
+            <a:cxnSpLocks/>
+            <a:stCxn id="19" idx="3"/>
+          </p:cNvCxnSpPr>
+          <p:nvPr/>
+        </p:nvCxnSpPr>
+        <p:spPr>
+          <a:xfrm>
+            <a:off x="5393703" y="3429000"/>
+            <a:ext cx="789608" cy="0"/>
+          </a:xfrm>
+          <a:prstGeom prst="straightConnector1">
+            <a:avLst/>
+          </a:prstGeom>
+          <a:ln w="57150">
+            <a:solidFill>
+              <a:schemeClr val="tx1"/>
+            </a:solidFill>
+            <a:headEnd type="none" w="med" len="med"/>
+            <a:tailEnd type="triangle"/>
+          </a:ln>
+        </p:spPr>
+        <p:style>
+          <a:lnRef idx="1">
+            <a:schemeClr val="accent1"/>
+          </a:lnRef>
+          <a:fillRef idx="0">
+            <a:schemeClr val="accent1"/>
+          </a:fillRef>
+          <a:effectRef idx="0">
+            <a:schemeClr val="accent1"/>
+          </a:effectRef>
+          <a:fontRef idx="minor">
+            <a:schemeClr val="tx1"/>
+          </a:fontRef>
+        </p:style>
+      </p:cxnSp>
+      <p:sp>
+        <p:nvSpPr>
+          <p:cNvPr id="39" name="Speech Bubble: Rectangle 38">
+            <a:extLst>
+              <a:ext uri="{FF2B5EF4-FFF2-40B4-BE49-F238E27FC236}">
+                <a16:creationId xmlns:a16="http://schemas.microsoft.com/office/drawing/2014/main" id="{24567D07-16BB-4C27-908C-4F840E28F1FE}"/>
+              </a:ext>
+            </a:extLst>
+          </p:cNvPr>
+          <p:cNvSpPr/>
+          <p:nvPr/>
+        </p:nvSpPr>
+        <p:spPr bwMode="gray">
+          <a:xfrm>
+            <a:off x="8740023" y="5167406"/>
+            <a:ext cx="2826226" cy="1086530"/>
+          </a:xfrm>
+          <a:prstGeom prst="wedgeRectCallout">
+            <a:avLst>
+              <a:gd name="adj1" fmla="val -6196"/>
+              <a:gd name="adj2" fmla="val -130558"/>
+            </a:avLst>
+          </a:prstGeom>
+          <a:ln>
+            <a:headEnd/>
+            <a:tailEnd/>
+          </a:ln>
+        </p:spPr>
+        <p:style>
+          <a:lnRef idx="2">
+            <a:schemeClr val="accent5"/>
+          </a:lnRef>
+          <a:fillRef idx="1">
+            <a:schemeClr val="lt1"/>
+          </a:fillRef>
+          <a:effectRef idx="0">
+            <a:schemeClr val="accent5"/>
+          </a:effectRef>
+          <a:fontRef idx="minor">
+            <a:schemeClr val="dk1"/>
+          </a:fontRef>
+        </p:style>
+        <p:txBody>
+          <a:bodyPr lIns="90000" tIns="72000" rIns="90000" bIns="72000" rtlCol="0" anchor="ctr"/>
+          <a:lstStyle/>
+          <a:p>
+            <a:pPr marR="0" algn="ctr" defTabSz="914400" eaLnBrk="1" fontAlgn="base" latinLnBrk="0" hangingPunct="1">
+              <a:lnSpc>
+                <a:spcPct val="100000"/>
+              </a:lnSpc>
+              <a:spcBef>
+                <a:spcPct val="50000"/>
+              </a:spcBef>
+              <a:spcAft>
+                <a:spcPct val="0"/>
+              </a:spcAft>
+              <a:buClr>
+                <a:srgbClr val="F0AB00"/>
+              </a:buClr>
+              <a:buSzPct val="80000"/>
+              <a:tabLst/>
+            </a:pPr>
+            <a:r>
+              <a:rPr kumimoji="0" lang="en-US" sz="1800" b="0" i="0" u="none" strike="noStrike" kern="0" cap="none" spc="0" normalizeH="0" baseline="0" noProof="0" dirty="0">
+                <a:ln>
+                  <a:noFill/>
+                </a:ln>
+                <a:effectLst/>
+                <a:uLnTx/>
+                <a:uFillTx/>
+                <a:ea typeface="Arial Unicode MS" pitchFamily="34" charset="-128"/>
+                <a:cs typeface="Arial Unicode MS" pitchFamily="34" charset="-128"/>
+              </a:rPr>
+              <a:t>Upon PVC deletion reclaim policy is executed</a:t>
+            </a:r>
+          </a:p>
+        </p:txBody>
+      </p:sp>
+      <p:grpSp>
+        <p:nvGrpSpPr>
+          <p:cNvPr id="42" name="Group 41">
+            <a:extLst>
+              <a:ext uri="{FF2B5EF4-FFF2-40B4-BE49-F238E27FC236}">
+                <a16:creationId xmlns:a16="http://schemas.microsoft.com/office/drawing/2014/main" id="{D69D703F-012B-4E67-BFD2-D5A614F6E503}"/>
+              </a:ext>
+            </a:extLst>
+          </p:cNvPr>
+          <p:cNvGrpSpPr/>
+          <p:nvPr/>
+        </p:nvGrpSpPr>
+        <p:grpSpPr>
+          <a:xfrm>
+            <a:off x="9390346" y="2526523"/>
+            <a:ext cx="1803653" cy="1804951"/>
+            <a:chOff x="8041527" y="2440671"/>
+            <a:chExt cx="1803653" cy="1804951"/>
+          </a:xfrm>
+        </p:grpSpPr>
+        <p:sp>
+          <p:nvSpPr>
+            <p:cNvPr id="40" name="Rectangle: Diagonal Corners Rounded 39">
+              <a:extLst>
+                <a:ext uri="{FF2B5EF4-FFF2-40B4-BE49-F238E27FC236}">
+                  <a16:creationId xmlns:a16="http://schemas.microsoft.com/office/drawing/2014/main" id="{9E3777A7-A4C8-4913-9241-C0CB955EA765}"/>
+                </a:ext>
+              </a:extLst>
+            </p:cNvPr>
+            <p:cNvSpPr/>
+            <p:nvPr/>
+          </p:nvSpPr>
+          <p:spPr bwMode="gray">
+            <a:xfrm>
+              <a:off x="8041527" y="2787030"/>
+              <a:ext cx="1803653" cy="1112233"/>
+            </a:xfrm>
+            <a:prstGeom prst="round2DiagRect">
+              <a:avLst/>
+            </a:prstGeom>
+            <a:ln>
+              <a:headEnd/>
+              <a:tailEnd/>
+            </a:ln>
+          </p:spPr>
+          <p:style>
+            <a:lnRef idx="2">
+              <a:schemeClr val="accent2"/>
+            </a:lnRef>
+            <a:fillRef idx="1">
+              <a:schemeClr val="lt1"/>
+            </a:fillRef>
+            <a:effectRef idx="0">
+              <a:schemeClr val="accent2"/>
+            </a:effectRef>
+            <a:fontRef idx="minor">
+              <a:schemeClr val="dk1"/>
+            </a:fontRef>
+          </p:style>
+          <p:txBody>
+            <a:bodyPr lIns="90000" tIns="72000" rIns="90000" bIns="72000" rtlCol="0" anchor="ctr"/>
+            <a:lstStyle/>
+            <a:p>
+              <a:pPr algn="ctr" defTabSz="914400" fontAlgn="base">
+                <a:spcBef>
+                  <a:spcPct val="50000"/>
+                </a:spcBef>
+                <a:spcAft>
+                  <a:spcPct val="0"/>
+                </a:spcAft>
+                <a:buClr>
+                  <a:srgbClr val="F0AB00"/>
+                </a:buClr>
+                <a:buSzPct val="80000"/>
+              </a:pPr>
+              <a:r>
+                <a:rPr lang="en-US" sz="1800" kern="0" dirty="0">
+                  <a:solidFill>
+                    <a:schemeClr val="dk1"/>
+                  </a:solidFill>
+                  <a:latin typeface="+mn-lt"/>
+                  <a:ea typeface="Arial Unicode MS" pitchFamily="34" charset="-128"/>
+                  <a:cs typeface="Arial Unicode MS" pitchFamily="34" charset="-128"/>
+                </a:rPr>
+                <a:t>Persistent Volume Claim</a:t>
+              </a:r>
+            </a:p>
+          </p:txBody>
+        </p:sp>
+        <p:sp>
+          <p:nvSpPr>
+            <p:cNvPr id="41" name="Cross 40">
+              <a:extLst>
+                <a:ext uri="{FF2B5EF4-FFF2-40B4-BE49-F238E27FC236}">
+                  <a16:creationId xmlns:a16="http://schemas.microsoft.com/office/drawing/2014/main" id="{E055B24B-F60B-4511-A239-3F8A0E8A1488}"/>
+                </a:ext>
+              </a:extLst>
+            </p:cNvPr>
+            <p:cNvSpPr/>
+            <p:nvPr/>
+          </p:nvSpPr>
+          <p:spPr bwMode="gray">
+            <a:xfrm rot="2690790">
+              <a:off x="8045684" y="2440671"/>
+              <a:ext cx="1795337" cy="1804951"/>
+            </a:xfrm>
+            <a:prstGeom prst="plus">
+              <a:avLst>
+                <a:gd name="adj" fmla="val 44715"/>
+              </a:avLst>
+            </a:prstGeom>
+            <a:solidFill>
+              <a:schemeClr val="accent5">
+                <a:lumMod val="40000"/>
+                <a:lumOff val="60000"/>
+              </a:schemeClr>
+            </a:solidFill>
+            <a:ln>
+              <a:headEnd/>
+              <a:tailEnd/>
+            </a:ln>
+          </p:spPr>
+          <p:style>
+            <a:lnRef idx="2">
+              <a:schemeClr val="accent5"/>
+            </a:lnRef>
+            <a:fillRef idx="1">
+              <a:schemeClr val="lt1"/>
+            </a:fillRef>
+            <a:effectRef idx="0">
+              <a:schemeClr val="accent5"/>
+            </a:effectRef>
+            <a:fontRef idx="minor">
+              <a:schemeClr val="dk1"/>
+            </a:fontRef>
+          </p:style>
+          <p:txBody>
+            <a:bodyPr lIns="90000" tIns="72000" rIns="90000" bIns="72000" rtlCol="0" anchor="ctr"/>
+            <a:lstStyle/>
+            <a:p>
+              <a:pPr marR="0" algn="ctr" defTabSz="914400" eaLnBrk="1" fontAlgn="base" latinLnBrk="0" hangingPunct="1">
+                <a:lnSpc>
+                  <a:spcPct val="100000"/>
+                </a:lnSpc>
+                <a:spcBef>
+                  <a:spcPct val="50000"/>
+                </a:spcBef>
+                <a:spcAft>
+                  <a:spcPct val="0"/>
+                </a:spcAft>
+                <a:buClr>
+                  <a:srgbClr val="F0AB00"/>
+                </a:buClr>
+                <a:buSzPct val="80000"/>
+                <a:tabLst/>
+              </a:pPr>
+              <a:endParaRPr kumimoji="0" lang="en-US" sz="1800" b="0" i="0" u="none" strike="noStrike" kern="0" cap="none" spc="0" normalizeH="0" baseline="0" noProof="0" dirty="0" err="1">
+                <a:ln>
+                  <a:noFill/>
+                </a:ln>
+                <a:effectLst/>
+                <a:uLnTx/>
+                <a:uFillTx/>
+                <a:ea typeface="Arial Unicode MS" pitchFamily="34" charset="-128"/>
+                <a:cs typeface="Arial Unicode MS" pitchFamily="34" charset="-128"/>
+              </a:endParaRPr>
+            </a:p>
+          </p:txBody>
+        </p:sp>
+      </p:grpSp>
+      <p:cxnSp>
+        <p:nvCxnSpPr>
+          <p:cNvPr id="43" name="Straight Arrow Connector 42">
+            <a:extLst>
+              <a:ext uri="{FF2B5EF4-FFF2-40B4-BE49-F238E27FC236}">
+                <a16:creationId xmlns:a16="http://schemas.microsoft.com/office/drawing/2014/main" id="{E3D5F030-2397-4CF3-BADE-A03F7A6A5F10}"/>
+              </a:ext>
+            </a:extLst>
+          </p:cNvPr>
+          <p:cNvCxnSpPr>
+            <a:cxnSpLocks/>
+            <a:endCxn id="40" idx="2"/>
+          </p:cNvCxnSpPr>
+          <p:nvPr/>
+        </p:nvCxnSpPr>
+        <p:spPr>
+          <a:xfrm>
+            <a:off x="7689236" y="3428999"/>
+            <a:ext cx="1701110" cy="0"/>
+          </a:xfrm>
+          <a:prstGeom prst="straightConnector1">
+            <a:avLst/>
+          </a:prstGeom>
+          <a:ln w="57150">
+            <a:solidFill>
+              <a:schemeClr val="tx1"/>
+            </a:solidFill>
+            <a:headEnd type="none" w="med" len="med"/>
+            <a:tailEnd type="triangle"/>
+          </a:ln>
+        </p:spPr>
+        <p:style>
+          <a:lnRef idx="1">
+            <a:schemeClr val="accent1"/>
+          </a:lnRef>
+          <a:fillRef idx="0">
+            <a:schemeClr val="accent1"/>
+          </a:fillRef>
+          <a:effectRef idx="0">
+            <a:schemeClr val="accent1"/>
+          </a:effectRef>
+          <a:fontRef idx="minor">
+            <a:schemeClr val="tx1"/>
+          </a:fontRef>
+        </p:style>
+      </p:cxnSp>
+      <p:sp>
+        <p:nvSpPr>
+          <p:cNvPr id="48" name="Speech Bubble: Rectangle 47">
+            <a:extLst>
+              <a:ext uri="{FF2B5EF4-FFF2-40B4-BE49-F238E27FC236}">
+                <a16:creationId xmlns:a16="http://schemas.microsoft.com/office/drawing/2014/main" id="{24A5F8BA-B3D0-4F4F-A49D-3D4B06BDBD14}"/>
+              </a:ext>
+            </a:extLst>
+          </p:cNvPr>
+          <p:cNvSpPr/>
+          <p:nvPr/>
+        </p:nvSpPr>
+        <p:spPr bwMode="gray">
+          <a:xfrm>
+            <a:off x="5103859" y="1150582"/>
+            <a:ext cx="2826226" cy="915844"/>
+          </a:xfrm>
+          <a:prstGeom prst="wedgeRectCallout">
+            <a:avLst>
+              <a:gd name="adj1" fmla="val 6816"/>
+              <a:gd name="adj2" fmla="val 105532"/>
+            </a:avLst>
+          </a:prstGeom>
+          <a:ln>
+            <a:headEnd/>
+            <a:tailEnd/>
+          </a:ln>
+        </p:spPr>
+        <p:style>
+          <a:lnRef idx="2">
+            <a:schemeClr val="accent5"/>
+          </a:lnRef>
+          <a:fillRef idx="1">
+            <a:schemeClr val="lt1"/>
+          </a:fillRef>
+          <a:effectRef idx="0">
+            <a:schemeClr val="accent5"/>
+          </a:effectRef>
+          <a:fontRef idx="minor">
+            <a:schemeClr val="dk1"/>
+          </a:fontRef>
+        </p:style>
+        <p:txBody>
+          <a:bodyPr lIns="90000" tIns="72000" rIns="90000" bIns="72000" rtlCol="0" anchor="ctr"/>
+          <a:lstStyle/>
+          <a:p>
+            <a:pPr marR="0" algn="ctr" defTabSz="914400" eaLnBrk="1" fontAlgn="base" latinLnBrk="0" hangingPunct="1">
+              <a:lnSpc>
+                <a:spcPct val="100000"/>
+              </a:lnSpc>
+              <a:spcBef>
+                <a:spcPct val="50000"/>
+              </a:spcBef>
+              <a:spcAft>
+                <a:spcPct val="0"/>
+              </a:spcAft>
+              <a:buClr>
+                <a:srgbClr val="F0AB00"/>
+              </a:buClr>
+              <a:buSzPct val="80000"/>
+              <a:tabLst/>
+            </a:pPr>
+            <a:r>
+              <a:rPr lang="en-US" sz="1800" kern="0" dirty="0">
+                <a:ea typeface="Arial Unicode MS" pitchFamily="34" charset="-128"/>
+                <a:cs typeface="Arial Unicode MS" pitchFamily="34" charset="-128"/>
+              </a:rPr>
+              <a:t>PVC will be bound to PV</a:t>
+            </a:r>
+            <a:endParaRPr kumimoji="0" lang="en-US" sz="1800" b="0" i="0" u="none" strike="noStrike" kern="0" cap="none" spc="0" normalizeH="0" baseline="0" noProof="0" dirty="0" err="1">
+              <a:ln>
+                <a:noFill/>
+              </a:ln>
+              <a:effectLst/>
+              <a:uLnTx/>
+              <a:uFillTx/>
+              <a:ea typeface="Arial Unicode MS" pitchFamily="34" charset="-128"/>
+              <a:cs typeface="Arial Unicode MS" pitchFamily="34" charset="-128"/>
+            </a:endParaRPr>
+          </a:p>
+        </p:txBody>
+      </p:sp>
+      <p:pic>
+        <p:nvPicPr>
+          <p:cNvPr id="51" name="Graphic 50" descr="Hourglass">
+            <a:extLst>
+              <a:ext uri="{FF2B5EF4-FFF2-40B4-BE49-F238E27FC236}">
+                <a16:creationId xmlns:a16="http://schemas.microsoft.com/office/drawing/2014/main" id="{7E6E0185-C6A4-478D-A431-4DF3C26581BE}"/>
+              </a:ext>
+            </a:extLst>
+          </p:cNvPr>
+          <p:cNvPicPr>
+            <a:picLocks noChangeAspect="1"/>
+          </p:cNvPicPr>
+          <p:nvPr/>
+        </p:nvPicPr>
+        <p:blipFill>
+          <a:blip r:embed="rId3">
+            <a:extLst>
+              <a:ext uri="{96DAC541-7B7A-43D3-8B79-37D633B846F1}">
+                <asvg:svgBlip xmlns:asvg="http://schemas.microsoft.com/office/drawing/2016/SVG/main" r:embed="rId4"/>
+              </a:ext>
+            </a:extLst>
+          </a:blip>
+          <a:stretch>
+            <a:fillRect/>
+          </a:stretch>
+        </p:blipFill>
+        <p:spPr>
+          <a:xfrm>
+            <a:off x="9488580" y="2611738"/>
+            <a:ext cx="1625907" cy="1625907"/>
+          </a:xfrm>
+          <a:prstGeom prst="rect">
+            <a:avLst/>
+          </a:prstGeom>
+        </p:spPr>
+      </p:pic>
+    </p:spTree>
+    <p:extLst>
+      <p:ext uri="{BB962C8B-B14F-4D97-AF65-F5344CB8AC3E}">
+        <p14:creationId xmlns:p14="http://schemas.microsoft.com/office/powerpoint/2010/main" val="447519709"/>
+      </p:ext>
+    </p:extLst>
+  </p:cSld>
+  <p:clrMapOvr>
+    <a:masterClrMapping/>
+  </p:clrMapOvr>
+  <p:timing>
+    <p:tnLst>
+      <p:par>
+        <p:cTn id="1" dur="indefinite" restart="never" nodeType="tmRoot">
+          <p:childTnLst>
+            <p:seq concurrent="1" nextAc="seek">
+              <p:cTn id="2" dur="indefinite" nodeType="mainSeq">
+                <p:childTnLst>
+                  <p:par>
+                    <p:cTn id="3" fill="hold">
+                      <p:stCondLst>
+                        <p:cond delay="indefinite"/>
+                      </p:stCondLst>
+                      <p:childTnLst>
+                        <p:par>
+                          <p:cTn id="4" fill="hold">
+                            <p:stCondLst>
+                              <p:cond delay="0"/>
+                            </p:stCondLst>
+                            <p:childTnLst>
+                              <p:par>
+                                <p:cTn id="5" presetID="1" presetClass="entr" presetSubtype="0" fill="hold" grpId="0" nodeType="clickEffect">
+                                  <p:stCondLst>
+                                    <p:cond delay="0"/>
+                                  </p:stCondLst>
+                                  <p:childTnLst>
+                                    <p:set>
+                                      <p:cBhvr>
+                                        <p:cTn id="6" dur="1" fill="hold">
+                                          <p:stCondLst>
+                                            <p:cond delay="0"/>
+                                          </p:stCondLst>
+                                        </p:cTn>
+                                        <p:tgtEl>
+                                          <p:spTgt spid="19"/>
+                                        </p:tgtEl>
+                                        <p:attrNameLst>
+                                          <p:attrName>style.visibility</p:attrName>
+                                        </p:attrNameLst>
+                                      </p:cBhvr>
+                                      <p:to>
+                                        <p:strVal val="visible"/>
+                                      </p:to>
+                                    </p:set>
+                                  </p:childTnLst>
+                                </p:cTn>
+                              </p:par>
+                              <p:par>
+                                <p:cTn id="7" presetID="1" presetClass="entr" presetSubtype="0" fill="hold" nodeType="withEffect">
+                                  <p:stCondLst>
+                                    <p:cond delay="0"/>
+                                  </p:stCondLst>
+                                  <p:childTnLst>
+                                    <p:set>
+                                      <p:cBhvr>
+                                        <p:cTn id="8" dur="1" fill="hold">
+                                          <p:stCondLst>
+                                            <p:cond delay="0"/>
+                                          </p:stCondLst>
+                                        </p:cTn>
+                                        <p:tgtEl>
+                                          <p:spTgt spid="7"/>
+                                        </p:tgtEl>
+                                        <p:attrNameLst>
+                                          <p:attrName>style.visibility</p:attrName>
+                                        </p:attrNameLst>
+                                      </p:cBhvr>
+                                      <p:to>
+                                        <p:strVal val="visible"/>
+                                      </p:to>
+                                    </p:set>
+                                  </p:childTnLst>
+                                </p:cTn>
+                              </p:par>
+                              <p:par>
+                                <p:cTn id="9" presetID="1" presetClass="entr" presetSubtype="0" fill="hold" grpId="0" nodeType="withEffect">
+                                  <p:stCondLst>
+                                    <p:cond delay="0"/>
+                                  </p:stCondLst>
+                                  <p:childTnLst>
+                                    <p:set>
+                                      <p:cBhvr>
+                                        <p:cTn id="10" dur="1" fill="hold">
+                                          <p:stCondLst>
+                                            <p:cond delay="0"/>
+                                          </p:stCondLst>
+                                        </p:cTn>
+                                        <p:tgtEl>
+                                          <p:spTgt spid="25"/>
+                                        </p:tgtEl>
+                                        <p:attrNameLst>
+                                          <p:attrName>style.visibility</p:attrName>
+                                        </p:attrNameLst>
+                                      </p:cBhvr>
+                                      <p:to>
+                                        <p:strVal val="visible"/>
+                                      </p:to>
+                                    </p:set>
+                                  </p:childTnLst>
+                                </p:cTn>
+                              </p:par>
+                            </p:childTnLst>
+                          </p:cTn>
+                        </p:par>
+                      </p:childTnLst>
+                    </p:cTn>
+                  </p:par>
+                  <p:par>
+                    <p:cTn id="11" fill="hold">
+                      <p:stCondLst>
+                        <p:cond delay="indefinite"/>
+                      </p:stCondLst>
+                      <p:childTnLst>
+                        <p:par>
+                          <p:cTn id="12" fill="hold">
+                            <p:stCondLst>
+                              <p:cond delay="0"/>
+                            </p:stCondLst>
+                            <p:childTnLst>
+                              <p:par>
+                                <p:cTn id="13" presetID="1" presetClass="entr" presetSubtype="0" fill="hold" grpId="0" nodeType="clickEffect">
+                                  <p:stCondLst>
+                                    <p:cond delay="0"/>
+                                  </p:stCondLst>
+                                  <p:childTnLst>
+                                    <p:set>
+                                      <p:cBhvr>
+                                        <p:cTn id="14" dur="1" fill="hold">
+                                          <p:stCondLst>
+                                            <p:cond delay="0"/>
+                                          </p:stCondLst>
+                                        </p:cTn>
+                                        <p:tgtEl>
+                                          <p:spTgt spid="26"/>
+                                        </p:tgtEl>
+                                        <p:attrNameLst>
+                                          <p:attrName>style.visibility</p:attrName>
+                                        </p:attrNameLst>
+                                      </p:cBhvr>
+                                      <p:to>
+                                        <p:strVal val="visible"/>
+                                      </p:to>
+                                    </p:set>
+                                  </p:childTnLst>
+                                </p:cTn>
+                              </p:par>
+                              <p:par>
+                                <p:cTn id="15" presetID="1" presetClass="entr" presetSubtype="0" fill="hold" nodeType="withEffect">
+                                  <p:stCondLst>
+                                    <p:cond delay="0"/>
+                                  </p:stCondLst>
+                                  <p:childTnLst>
+                                    <p:set>
+                                      <p:cBhvr>
+                                        <p:cTn id="16" dur="1" fill="hold">
+                                          <p:stCondLst>
+                                            <p:cond delay="0"/>
+                                          </p:stCondLst>
+                                        </p:cTn>
+                                        <p:tgtEl>
+                                          <p:spTgt spid="36"/>
+                                        </p:tgtEl>
+                                        <p:attrNameLst>
+                                          <p:attrName>style.visibility</p:attrName>
+                                        </p:attrNameLst>
+                                      </p:cBhvr>
+                                      <p:to>
+                                        <p:strVal val="visible"/>
+                                      </p:to>
+                                    </p:set>
+                                  </p:childTnLst>
+                                </p:cTn>
+                              </p:par>
+                              <p:par>
+                                <p:cTn id="17" presetID="1" presetClass="entr" presetSubtype="0" fill="hold" grpId="0" nodeType="withEffect">
+                                  <p:stCondLst>
+                                    <p:cond delay="0"/>
+                                  </p:stCondLst>
+                                  <p:childTnLst>
+                                    <p:set>
+                                      <p:cBhvr>
+                                        <p:cTn id="18" dur="1" fill="hold">
+                                          <p:stCondLst>
+                                            <p:cond delay="0"/>
+                                          </p:stCondLst>
+                                        </p:cTn>
+                                        <p:tgtEl>
+                                          <p:spTgt spid="27"/>
+                                        </p:tgtEl>
+                                        <p:attrNameLst>
+                                          <p:attrName>style.visibility</p:attrName>
+                                        </p:attrNameLst>
+                                      </p:cBhvr>
+                                      <p:to>
+                                        <p:strVal val="visible"/>
+                                      </p:to>
+                                    </p:set>
+                                  </p:childTnLst>
+                                </p:cTn>
+                              </p:par>
+                              <p:par>
+                                <p:cTn id="19" presetID="1" presetClass="entr" presetSubtype="0" fill="hold" grpId="0" nodeType="withEffect">
+                                  <p:stCondLst>
+                                    <p:cond delay="0"/>
+                                  </p:stCondLst>
+                                  <p:childTnLst>
+                                    <p:set>
+                                      <p:cBhvr>
+                                        <p:cTn id="20" dur="1" fill="hold">
+                                          <p:stCondLst>
+                                            <p:cond delay="0"/>
+                                          </p:stCondLst>
+                                        </p:cTn>
+                                        <p:tgtEl>
+                                          <p:spTgt spid="48"/>
+                                        </p:tgtEl>
+                                        <p:attrNameLst>
+                                          <p:attrName>style.visibility</p:attrName>
+                                        </p:attrNameLst>
+                                      </p:cBhvr>
+                                      <p:to>
+                                        <p:strVal val="visible"/>
+                                      </p:to>
+                                    </p:set>
+                                  </p:childTnLst>
+                                </p:cTn>
+                              </p:par>
+                              <p:par>
+                                <p:cTn id="21" presetID="1" presetClass="entr" presetSubtype="0" fill="hold" nodeType="withEffect">
+                                  <p:stCondLst>
+                                    <p:cond delay="0"/>
+                                  </p:stCondLst>
+                                  <p:childTnLst>
+                                    <p:set>
+                                      <p:cBhvr>
+                                        <p:cTn id="22" dur="1" fill="hold">
+                                          <p:stCondLst>
+                                            <p:cond delay="0"/>
+                                          </p:stCondLst>
+                                        </p:cTn>
+                                        <p:tgtEl>
+                                          <p:spTgt spid="33"/>
+                                        </p:tgtEl>
+                                        <p:attrNameLst>
+                                          <p:attrName>style.visibility</p:attrName>
+                                        </p:attrNameLst>
+                                      </p:cBhvr>
+                                      <p:to>
+                                        <p:strVal val="visible"/>
+                                      </p:to>
+                                    </p:set>
+                                  </p:childTnLst>
+                                </p:cTn>
+                              </p:par>
+                            </p:childTnLst>
+                          </p:cTn>
+                        </p:par>
+                      </p:childTnLst>
+                    </p:cTn>
+                  </p:par>
+                  <p:par>
+                    <p:cTn id="23" fill="hold">
+                      <p:stCondLst>
+                        <p:cond delay="indefinite"/>
+                      </p:stCondLst>
+                      <p:childTnLst>
+                        <p:par>
+                          <p:cTn id="24" fill="hold">
+                            <p:stCondLst>
+                              <p:cond delay="0"/>
+                            </p:stCondLst>
+                            <p:childTnLst>
+                              <p:par>
+                                <p:cTn id="25" presetID="1" presetClass="entr" presetSubtype="0" fill="hold" nodeType="clickEffect">
+                                  <p:stCondLst>
+                                    <p:cond delay="0"/>
+                                  </p:stCondLst>
+                                  <p:childTnLst>
+                                    <p:set>
+                                      <p:cBhvr>
+                                        <p:cTn id="26" dur="1" fill="hold">
+                                          <p:stCondLst>
+                                            <p:cond delay="0"/>
+                                          </p:stCondLst>
+                                        </p:cTn>
+                                        <p:tgtEl>
+                                          <p:spTgt spid="51"/>
+                                        </p:tgtEl>
+                                        <p:attrNameLst>
+                                          <p:attrName>style.visibility</p:attrName>
+                                        </p:attrNameLst>
+                                      </p:cBhvr>
+                                      <p:to>
+                                        <p:strVal val="visible"/>
+                                      </p:to>
+                                    </p:set>
+                                  </p:childTnLst>
+                                </p:cTn>
+                              </p:par>
+                            </p:childTnLst>
+                          </p:cTn>
+                        </p:par>
+                      </p:childTnLst>
+                    </p:cTn>
+                  </p:par>
+                  <p:par>
+                    <p:cTn id="27" fill="hold">
+                      <p:stCondLst>
+                        <p:cond delay="indefinite"/>
+                      </p:stCondLst>
+                      <p:childTnLst>
+                        <p:par>
+                          <p:cTn id="28" fill="hold">
+                            <p:stCondLst>
+                              <p:cond delay="0"/>
+                            </p:stCondLst>
+                            <p:childTnLst>
+                              <p:par>
+                                <p:cTn id="29" presetID="1" presetClass="exit" presetSubtype="0" fill="hold" nodeType="clickEffect">
+                                  <p:stCondLst>
+                                    <p:cond delay="0"/>
+                                  </p:stCondLst>
+                                  <p:childTnLst>
+                                    <p:set>
+                                      <p:cBhvr>
+                                        <p:cTn id="30" dur="1" fill="hold">
+                                          <p:stCondLst>
+                                            <p:cond delay="0"/>
+                                          </p:stCondLst>
+                                        </p:cTn>
+                                        <p:tgtEl>
+                                          <p:spTgt spid="51"/>
+                                        </p:tgtEl>
+                                        <p:attrNameLst>
+                                          <p:attrName>style.visibility</p:attrName>
+                                        </p:attrNameLst>
+                                      </p:cBhvr>
+                                      <p:to>
+                                        <p:strVal val="hidden"/>
+                                      </p:to>
+                                    </p:set>
+                                  </p:childTnLst>
+                                </p:cTn>
+                              </p:par>
+                            </p:childTnLst>
+                          </p:cTn>
+                        </p:par>
+                        <p:par>
+                          <p:cTn id="31" fill="hold">
+                            <p:stCondLst>
+                              <p:cond delay="0"/>
+                            </p:stCondLst>
+                            <p:childTnLst>
+                              <p:par>
+                                <p:cTn id="32" presetID="1" presetClass="entr" presetSubtype="0" fill="hold" nodeType="afterEffect">
+                                  <p:stCondLst>
+                                    <p:cond delay="0"/>
+                                  </p:stCondLst>
+                                  <p:childTnLst>
+                                    <p:set>
+                                      <p:cBhvr>
+                                        <p:cTn id="33" dur="1" fill="hold">
+                                          <p:stCondLst>
+                                            <p:cond delay="0"/>
+                                          </p:stCondLst>
+                                        </p:cTn>
+                                        <p:tgtEl>
+                                          <p:spTgt spid="42"/>
+                                        </p:tgtEl>
+                                        <p:attrNameLst>
+                                          <p:attrName>style.visibility</p:attrName>
+                                        </p:attrNameLst>
+                                      </p:cBhvr>
+                                      <p:to>
+                                        <p:strVal val="visible"/>
+                                      </p:to>
+                                    </p:set>
+                                  </p:childTnLst>
+                                </p:cTn>
+                              </p:par>
+                              <p:par>
+                                <p:cTn id="34" presetID="1" presetClass="entr" presetSubtype="0" fill="hold" grpId="0" nodeType="withEffect">
+                                  <p:stCondLst>
+                                    <p:cond delay="0"/>
+                                  </p:stCondLst>
+                                  <p:childTnLst>
+                                    <p:set>
+                                      <p:cBhvr>
+                                        <p:cTn id="35" dur="1" fill="hold">
+                                          <p:stCondLst>
+                                            <p:cond delay="0"/>
+                                          </p:stCondLst>
+                                        </p:cTn>
+                                        <p:tgtEl>
+                                          <p:spTgt spid="39"/>
+                                        </p:tgtEl>
+                                        <p:attrNameLst>
+                                          <p:attrName>style.visibility</p:attrName>
+                                        </p:attrNameLst>
+                                      </p:cBhvr>
+                                      <p:to>
+                                        <p:strVal val="visible"/>
+                                      </p:to>
+                                    </p:set>
+                                  </p:childTnLst>
+                                </p:cTn>
+                              </p:par>
+                              <p:par>
+                                <p:cTn id="36" presetID="1" presetClass="entr" presetSubtype="0" fill="hold" nodeType="withEffect">
+                                  <p:stCondLst>
+                                    <p:cond delay="0"/>
+                                  </p:stCondLst>
+                                  <p:childTnLst>
+                                    <p:set>
+                                      <p:cBhvr>
+                                        <p:cTn id="37" dur="1" fill="hold">
+                                          <p:stCondLst>
+                                            <p:cond delay="0"/>
+                                          </p:stCondLst>
+                                        </p:cTn>
+                                        <p:tgtEl>
+                                          <p:spTgt spid="43"/>
+                                        </p:tgtEl>
+                                        <p:attrNameLst>
+                                          <p:attrName>style.visibility</p:attrName>
+                                        </p:attrNameLst>
+                                      </p:cBhvr>
+                                      <p:to>
+                                        <p:strVal val="visible"/>
+                                      </p:to>
+                                    </p:set>
+                                  </p:childTnLst>
+                                </p:cTn>
+                              </p:par>
+                            </p:childTnLst>
+                          </p:cTn>
+                        </p:par>
+                      </p:childTnLst>
+                    </p:cTn>
+                  </p:par>
+                </p:childTnLst>
+              </p:cTn>
+              <p:prevCondLst>
+                <p:cond evt="onPrev" delay="0">
+                  <p:tgtEl>
+                    <p:sldTgt/>
+                  </p:tgtEl>
+                </p:cond>
+              </p:prevCondLst>
+              <p:nextCondLst>
+                <p:cond evt="onNext" delay="0">
+                  <p:tgtEl>
+                    <p:sldTgt/>
+                  </p:tgtEl>
+                </p:cond>
+              </p:nextCondLst>
+            </p:seq>
+          </p:childTnLst>
+        </p:cTn>
+      </p:par>
+    </p:tnLst>
+    <p:bldLst>
+      <p:bldP spid="19" grpId="0" animBg="1"/>
+      <p:bldP spid="25" grpId="0" animBg="1"/>
+      <p:bldP spid="26" grpId="0" animBg="1"/>
+      <p:bldP spid="27" grpId="0" animBg="1"/>
+      <p:bldP spid="39" grpId="0" animBg="1"/>
+      <p:bldP spid="48" grpId="0" animBg="1"/>
+    </p:bldLst>
+  </p:timing>
+</p:sld>
+</file>
+
+<file path=ppt/slides/slide11.xml><?xml version="1.0" encoding="utf-8"?>
+<p:sld xmlns:a="http://schemas.openxmlformats.org/drawingml/2006/main" xmlns:r="http://schemas.openxmlformats.org/officeDocument/2006/relationships" xmlns:p="http://schemas.openxmlformats.org/presentationml/2006/main" show="0">
+  <p:cSld>
+    <p:spTree>
+      <p:nvGrpSpPr>
+        <p:cNvPr id="1" name=""/>
+        <p:cNvGrpSpPr/>
+        <p:nvPr/>
+      </p:nvGrpSpPr>
+      <p:grpSpPr>
+        <a:xfrm>
+          <a:off x="0" y="0"/>
+          <a:ext cx="0" cy="0"/>
+          <a:chOff x="0" y="0"/>
+          <a:chExt cx="0" cy="0"/>
+        </a:xfrm>
+      </p:grpSpPr>
+      <p:sp>
+        <p:nvSpPr>
+          <p:cNvPr id="2" name="Title 1">
+            <a:extLst>
+              <a:ext uri="{FF2B5EF4-FFF2-40B4-BE49-F238E27FC236}">
+                <a16:creationId xmlns:a16="http://schemas.microsoft.com/office/drawing/2014/main" id="{D4C30A85-2277-4AED-93CC-D455D481D551}"/>
+              </a:ext>
+            </a:extLst>
+          </p:cNvPr>
+          <p:cNvSpPr>
+            <a:spLocks noGrp="1"/>
+          </p:cNvSpPr>
+          <p:nvPr>
+            <p:ph type="title"/>
+          </p:nvPr>
+        </p:nvSpPr>
+        <p:spPr/>
+        <p:txBody>
+          <a:bodyPr/>
+          <a:lstStyle/>
+          <a:p>
+            <a:r>
+              <a:rPr lang="en-US" dirty="0"/>
+              <a:t>PV/PVC lifecycle</a:t>
+            </a:r>
+          </a:p>
+        </p:txBody>
+      </p:sp>
+      <p:sp>
+        <p:nvSpPr>
+          <p:cNvPr id="3" name="Cylinder 2">
+            <a:extLst>
+              <a:ext uri="{FF2B5EF4-FFF2-40B4-BE49-F238E27FC236}">
+                <a16:creationId xmlns:a16="http://schemas.microsoft.com/office/drawing/2014/main" id="{793EEDFD-AF0F-41EC-8B33-559C22034EA9}"/>
+              </a:ext>
+            </a:extLst>
+          </p:cNvPr>
+          <p:cNvSpPr/>
+          <p:nvPr/>
+        </p:nvSpPr>
+        <p:spPr bwMode="gray">
+          <a:xfrm>
+            <a:off x="1766295" y="4104370"/>
+            <a:ext cx="1486490" cy="1104455"/>
+          </a:xfrm>
+          <a:prstGeom prst="can">
+            <a:avLst/>
+          </a:prstGeom>
+          <a:ln>
+            <a:headEnd/>
+            <a:tailEnd/>
+          </a:ln>
+        </p:spPr>
+        <p:style>
+          <a:lnRef idx="2">
+            <a:schemeClr val="accent2"/>
+          </a:lnRef>
+          <a:fillRef idx="1">
+            <a:schemeClr val="lt1"/>
+          </a:fillRef>
+          <a:effectRef idx="0">
+            <a:schemeClr val="accent2"/>
+          </a:effectRef>
+          <a:fontRef idx="minor">
+            <a:schemeClr val="dk1"/>
+          </a:fontRef>
+        </p:style>
+        <p:txBody>
+          <a:bodyPr lIns="90000" tIns="72000" rIns="90000" bIns="72000" rtlCol="0" anchor="ctr"/>
+          <a:lstStyle/>
+          <a:p>
+            <a:pPr marR="0" algn="ctr" defTabSz="914400" eaLnBrk="1" fontAlgn="base" latinLnBrk="0" hangingPunct="1">
+              <a:lnSpc>
+                <a:spcPct val="100000"/>
+              </a:lnSpc>
+              <a:spcBef>
+                <a:spcPct val="50000"/>
+              </a:spcBef>
+              <a:spcAft>
+                <a:spcPct val="0"/>
+              </a:spcAft>
+              <a:buClr>
+                <a:srgbClr val="F0AB00"/>
+              </a:buClr>
+              <a:buSzPct val="80000"/>
+              <a:tabLst/>
+            </a:pPr>
+            <a:r>
+              <a:rPr kumimoji="0" lang="en-US" sz="1800" b="0" i="0" u="none" strike="noStrike" kern="0" cap="none" spc="0" normalizeH="0" baseline="0" noProof="0" dirty="0">
+                <a:ln>
+                  <a:noFill/>
+                </a:ln>
+                <a:effectLst/>
+                <a:uLnTx/>
+                <a:uFillTx/>
+                <a:ea typeface="Arial Unicode MS" pitchFamily="34" charset="-128"/>
+                <a:cs typeface="Arial Unicode MS" pitchFamily="34" charset="-128"/>
+              </a:rPr>
+              <a:t>Persistent</a:t>
+            </a:r>
+            <a:r>
+              <a:rPr kumimoji="0" lang="en-US" sz="1800" b="0" i="0" u="none" strike="noStrike" kern="0" cap="none" spc="0" normalizeH="0" noProof="0" dirty="0">
+                <a:ln>
+                  <a:noFill/>
+                </a:ln>
+                <a:effectLst/>
+                <a:uLnTx/>
+                <a:uFillTx/>
+                <a:ea typeface="Arial Unicode MS" pitchFamily="34" charset="-128"/>
+                <a:cs typeface="Arial Unicode MS" pitchFamily="34" charset="-128"/>
+              </a:rPr>
+              <a:t> Volume</a:t>
+            </a:r>
+            <a:endParaRPr kumimoji="0" lang="en-US" sz="1800" b="0" i="0" u="none" strike="noStrike" kern="0" cap="none" spc="0" normalizeH="0" baseline="0" noProof="0" dirty="0">
+              <a:ln>
+                <a:noFill/>
+              </a:ln>
+              <a:effectLst/>
+              <a:uLnTx/>
+              <a:uFillTx/>
+              <a:ea typeface="Arial Unicode MS" pitchFamily="34" charset="-128"/>
+              <a:cs typeface="Arial Unicode MS" pitchFamily="34" charset="-128"/>
+            </a:endParaRPr>
+          </a:p>
+        </p:txBody>
+      </p:sp>
+      <p:sp>
+        <p:nvSpPr>
+          <p:cNvPr id="4" name="Rectangle: Diagonal Corners Rounded 3">
+            <a:extLst>
+              <a:ext uri="{FF2B5EF4-FFF2-40B4-BE49-F238E27FC236}">
+                <a16:creationId xmlns:a16="http://schemas.microsoft.com/office/drawing/2014/main" id="{A25A5F69-29A7-40A6-A263-64D33E2FFD63}"/>
+              </a:ext>
+            </a:extLst>
+          </p:cNvPr>
+          <p:cNvSpPr/>
+          <p:nvPr/>
+        </p:nvSpPr>
+        <p:spPr bwMode="gray">
+          <a:xfrm>
+            <a:off x="1607714" y="1799571"/>
+            <a:ext cx="1803653" cy="1112233"/>
+          </a:xfrm>
+          <a:prstGeom prst="round2DiagRect">
+            <a:avLst/>
+          </a:prstGeom>
+          <a:ln>
+            <a:headEnd/>
+            <a:tailEnd/>
+          </a:ln>
+        </p:spPr>
+        <p:style>
+          <a:lnRef idx="2">
+            <a:schemeClr val="accent2"/>
+          </a:lnRef>
+          <a:fillRef idx="1">
+            <a:schemeClr val="lt1"/>
+          </a:fillRef>
+          <a:effectRef idx="0">
+            <a:schemeClr val="accent2"/>
+          </a:effectRef>
+          <a:fontRef idx="minor">
+            <a:schemeClr val="dk1"/>
+          </a:fontRef>
+        </p:style>
+        <p:txBody>
+          <a:bodyPr lIns="90000" tIns="72000" rIns="90000" bIns="72000" rtlCol="0" anchor="ctr"/>
+          <a:lstStyle/>
+          <a:p>
+            <a:pPr algn="ctr" defTabSz="914400" fontAlgn="base">
+              <a:spcBef>
+                <a:spcPct val="50000"/>
+              </a:spcBef>
+              <a:spcAft>
+                <a:spcPct val="0"/>
+              </a:spcAft>
+              <a:buClr>
+                <a:srgbClr val="F0AB00"/>
+              </a:buClr>
+              <a:buSzPct val="80000"/>
+            </a:pPr>
+            <a:r>
+              <a:rPr lang="en-US" sz="1800" kern="0" dirty="0">
+                <a:solidFill>
+                  <a:schemeClr val="dk1"/>
+                </a:solidFill>
+                <a:latin typeface="+mn-lt"/>
+                <a:ea typeface="Arial Unicode MS" pitchFamily="34" charset="-128"/>
+                <a:cs typeface="Arial Unicode MS" pitchFamily="34" charset="-128"/>
+              </a:rPr>
+              <a:t>Persistent Volume Claim</a:t>
+            </a:r>
+          </a:p>
+        </p:txBody>
+      </p:sp>
+      <p:cxnSp>
+        <p:nvCxnSpPr>
+          <p:cNvPr id="5" name="Connector: Elbow 4">
+            <a:extLst>
+              <a:ext uri="{FF2B5EF4-FFF2-40B4-BE49-F238E27FC236}">
+                <a16:creationId xmlns:a16="http://schemas.microsoft.com/office/drawing/2014/main" id="{289FB161-7F8C-48C7-BC19-20271537C9C8}"/>
+              </a:ext>
+            </a:extLst>
+          </p:cNvPr>
+          <p:cNvCxnSpPr>
+            <a:cxnSpLocks/>
+            <a:stCxn id="4" idx="1"/>
+            <a:endCxn id="3" idx="1"/>
+          </p:cNvCxnSpPr>
+          <p:nvPr/>
+        </p:nvCxnSpPr>
+        <p:spPr>
+          <a:xfrm rot="5400000">
+            <a:off x="1913258" y="3508087"/>
+            <a:ext cx="1192566" cy="1"/>
+          </a:xfrm>
+          <a:prstGeom prst="bentConnector3">
+            <a:avLst>
+              <a:gd name="adj1" fmla="val 50000"/>
+            </a:avLst>
+          </a:prstGeom>
+          <a:ln w="57150">
+            <a:solidFill>
+              <a:schemeClr val="tx1"/>
+            </a:solidFill>
+            <a:headEnd type="triangle"/>
+            <a:tailEnd type="triangle"/>
+          </a:ln>
+        </p:spPr>
+        <p:style>
+          <a:lnRef idx="1">
+            <a:schemeClr val="accent1"/>
+          </a:lnRef>
+          <a:fillRef idx="0">
+            <a:schemeClr val="accent1"/>
+          </a:fillRef>
+          <a:effectRef idx="0">
+            <a:schemeClr val="accent1"/>
+          </a:effectRef>
+          <a:fontRef idx="minor">
+            <a:schemeClr val="tx1"/>
+          </a:fontRef>
+        </p:style>
+      </p:cxnSp>
+      <p:sp>
+        <p:nvSpPr>
+          <p:cNvPr id="11" name="Cross 10">
+            <a:extLst>
+              <a:ext uri="{FF2B5EF4-FFF2-40B4-BE49-F238E27FC236}">
+                <a16:creationId xmlns:a16="http://schemas.microsoft.com/office/drawing/2014/main" id="{8005E16A-1D9F-4051-A2FD-6E81E44F746D}"/>
+              </a:ext>
+            </a:extLst>
+          </p:cNvPr>
+          <p:cNvSpPr/>
+          <p:nvPr/>
+        </p:nvSpPr>
+        <p:spPr bwMode="gray">
+          <a:xfrm rot="2690790">
+            <a:off x="1611871" y="1453212"/>
+            <a:ext cx="1795337" cy="1804951"/>
+          </a:xfrm>
+          <a:prstGeom prst="plus">
+            <a:avLst>
+              <a:gd name="adj" fmla="val 44715"/>
+            </a:avLst>
+          </a:prstGeom>
+          <a:solidFill>
+            <a:schemeClr val="accent5">
+              <a:lumMod val="40000"/>
+              <a:lumOff val="60000"/>
+            </a:schemeClr>
+          </a:solidFill>
+          <a:ln>
+            <a:headEnd/>
+            <a:tailEnd/>
+          </a:ln>
+        </p:spPr>
+        <p:style>
+          <a:lnRef idx="2">
+            <a:schemeClr val="accent5"/>
+          </a:lnRef>
+          <a:fillRef idx="1">
+            <a:schemeClr val="lt1"/>
+          </a:fillRef>
+          <a:effectRef idx="0">
+            <a:schemeClr val="accent5"/>
+          </a:effectRef>
+          <a:fontRef idx="minor">
+            <a:schemeClr val="dk1"/>
+          </a:fontRef>
+        </p:style>
+        <p:txBody>
+          <a:bodyPr lIns="90000" tIns="72000" rIns="90000" bIns="72000" rtlCol="0" anchor="ctr"/>
+          <a:lstStyle/>
+          <a:p>
+            <a:pPr marR="0" algn="ctr" defTabSz="914400" eaLnBrk="1" fontAlgn="base" latinLnBrk="0" hangingPunct="1">
+              <a:lnSpc>
+                <a:spcPct val="100000"/>
+              </a:lnSpc>
+              <a:spcBef>
+                <a:spcPct val="50000"/>
+              </a:spcBef>
+              <a:spcAft>
+                <a:spcPct val="0"/>
+              </a:spcAft>
+              <a:buClr>
+                <a:srgbClr val="F0AB00"/>
+              </a:buClr>
+              <a:buSzPct val="80000"/>
+              <a:tabLst/>
+            </a:pPr>
+            <a:endParaRPr kumimoji="0" lang="en-US" sz="1800" b="0" i="0" u="none" strike="noStrike" kern="0" cap="none" spc="0" normalizeH="0" baseline="0" noProof="0" dirty="0" err="1">
+              <a:ln>
+                <a:noFill/>
+              </a:ln>
+              <a:effectLst/>
+              <a:uLnTx/>
+              <a:uFillTx/>
+              <a:ea typeface="Arial Unicode MS" pitchFamily="34" charset="-128"/>
+              <a:cs typeface="Arial Unicode MS" pitchFamily="34" charset="-128"/>
+            </a:endParaRPr>
+          </a:p>
+        </p:txBody>
+      </p:sp>
+      <p:sp>
+        <p:nvSpPr>
+          <p:cNvPr id="12" name="Rectangle 11">
+            <a:extLst>
+              <a:ext uri="{FF2B5EF4-FFF2-40B4-BE49-F238E27FC236}">
+                <a16:creationId xmlns:a16="http://schemas.microsoft.com/office/drawing/2014/main" id="{FD94F29F-DC71-4824-9A4B-4881FA97C554}"/>
+              </a:ext>
+            </a:extLst>
+          </p:cNvPr>
+          <p:cNvSpPr/>
+          <p:nvPr/>
+        </p:nvSpPr>
+        <p:spPr>
+          <a:xfrm>
+            <a:off x="4153475" y="1986088"/>
+            <a:ext cx="7537002" cy="2031325"/>
+          </a:xfrm>
+          <a:prstGeom prst="rect">
+            <a:avLst/>
+          </a:prstGeom>
+        </p:spPr>
+        <p:txBody>
+          <a:bodyPr wrap="square">
+            <a:spAutoFit/>
+          </a:bodyPr>
+          <a:lstStyle/>
+          <a:p>
+            <a:r>
+              <a:rPr lang="en-US" dirty="0"/>
+              <a:t>Deleting a PVC could cause the following:</a:t>
+            </a:r>
+          </a:p>
+          <a:p>
+            <a:pPr marL="342900" indent="-342900">
+              <a:buFont typeface="Wingdings" panose="05000000000000000000" pitchFamily="2" charset="2"/>
+              <a:buChar char="§"/>
+            </a:pPr>
+            <a:r>
+              <a:rPr lang="en-US" dirty="0"/>
+              <a:t>Retain – PV still exists including all data</a:t>
+            </a:r>
+          </a:p>
+          <a:p>
+            <a:pPr marL="342900" indent="-342900">
+              <a:buFont typeface="Wingdings" panose="05000000000000000000" pitchFamily="2" charset="2"/>
+              <a:buChar char="§"/>
+            </a:pPr>
+            <a:r>
+              <a:rPr lang="en-US" dirty="0"/>
+              <a:t>Delete – delete the PV and all data</a:t>
+            </a:r>
+          </a:p>
+          <a:p>
+            <a:pPr marL="342900" indent="-342900">
+              <a:buFont typeface="Wingdings" panose="05000000000000000000" pitchFamily="2" charset="2"/>
+              <a:buChar char="§"/>
+            </a:pPr>
+            <a:r>
+              <a:rPr lang="en-US" dirty="0"/>
+              <a:t>Recycle – delete data and make PV available again to be bound by a different PVC</a:t>
+            </a:r>
+          </a:p>
+          <a:p>
+            <a:pPr marL="342900" indent="-342900">
+              <a:buFont typeface="Wingdings" panose="05000000000000000000" pitchFamily="2" charset="2"/>
+              <a:buChar char="§"/>
+            </a:pPr>
+            <a:endParaRPr lang="en-US" dirty="0"/>
+          </a:p>
+        </p:txBody>
+      </p:sp>
+    </p:spTree>
+    <p:extLst>
+      <p:ext uri="{BB962C8B-B14F-4D97-AF65-F5344CB8AC3E}">
+        <p14:creationId xmlns:p14="http://schemas.microsoft.com/office/powerpoint/2010/main" val="2934522516"/>
+      </p:ext>
+    </p:extLst>
+  </p:cSld>
+  <p:clrMapOvr>
+    <a:masterClrMapping/>
+  </p:clrMapOvr>
+</p:sld>
+</file>
+
+<file path=ppt/slides/slide12.xml><?xml version="1.0" encoding="utf-8"?>
+<p:sld xmlns:a="http://schemas.openxmlformats.org/drawingml/2006/main" xmlns:r="http://schemas.openxmlformats.org/officeDocument/2006/relationships" xmlns:p="http://schemas.openxmlformats.org/presentationml/2006/main">
+  <p:cSld>
+    <p:spTree>
+      <p:nvGrpSpPr>
+        <p:cNvPr id="1" name=""/>
+        <p:cNvGrpSpPr/>
+        <p:nvPr/>
+      </p:nvGrpSpPr>
+      <p:grpSpPr>
+        <a:xfrm>
+          <a:off x="0" y="0"/>
+          <a:ext cx="0" cy="0"/>
+          <a:chOff x="0" y="0"/>
+          <a:chExt cx="0" cy="0"/>
+        </a:xfrm>
+      </p:grpSpPr>
+      <p:sp>
+        <p:nvSpPr>
           <p:cNvPr id="15" name="Rectangle: Diagonal Corners Rounded 14">
             <a:extLst>
               <a:ext uri="{FF2B5EF4-FFF2-40B4-BE49-F238E27FC236}">
@@ -21247,7 +23357,7 @@
 </p:sld>
 </file>
 
-<file path=ppt/slides/slide11.xml><?xml version="1.0" encoding="utf-8"?>
+<file path=ppt/slides/slide13.xml><?xml version="1.0" encoding="utf-8"?>
 <p:sld xmlns:a="http://schemas.openxmlformats.org/drawingml/2006/main" xmlns:r="http://schemas.openxmlformats.org/officeDocument/2006/relationships" xmlns:p="http://schemas.openxmlformats.org/presentationml/2006/main">
   <p:cSld>
     <p:spTree>
@@ -23133,7 +25243,7 @@
 </p:sld>
 </file>
 
-<file path=ppt/slides/slide12.xml><?xml version="1.0" encoding="utf-8"?>
+<file path=ppt/slides/slide14.xml><?xml version="1.0" encoding="utf-8"?>
 <p:sld xmlns:a="http://schemas.openxmlformats.org/drawingml/2006/main" xmlns:r="http://schemas.openxmlformats.org/officeDocument/2006/relationships" xmlns:p="http://schemas.openxmlformats.org/presentationml/2006/main">
   <p:cSld>
     <p:spTree>
@@ -25285,7 +27395,7 @@
 </p:sld>
 </file>
 
-<file path=ppt/slides/slide13.xml><?xml version="1.0" encoding="utf-8"?>
+<file path=ppt/slides/slide15.xml><?xml version="1.0" encoding="utf-8"?>
 <p:sld xmlns:a="http://schemas.openxmlformats.org/drawingml/2006/main" xmlns:r="http://schemas.openxmlformats.org/officeDocument/2006/relationships" xmlns:p="http://schemas.openxmlformats.org/presentationml/2006/main">
   <p:cSld>
     <p:spTree>
@@ -26864,538 +28974,7 @@
 </p:sld>
 </file>
 
-<file path=ppt/slides/slide14.xml><?xml version="1.0" encoding="utf-8"?>
-<p:sld xmlns:a="http://schemas.openxmlformats.org/drawingml/2006/main" xmlns:r="http://schemas.openxmlformats.org/officeDocument/2006/relationships" xmlns:p="http://schemas.openxmlformats.org/presentationml/2006/main">
-  <p:cSld>
-    <p:spTree>
-      <p:nvGrpSpPr>
-        <p:cNvPr id="1" name=""/>
-        <p:cNvGrpSpPr/>
-        <p:nvPr/>
-      </p:nvGrpSpPr>
-      <p:grpSpPr>
-        <a:xfrm>
-          <a:off x="0" y="0"/>
-          <a:ext cx="0" cy="0"/>
-          <a:chOff x="0" y="0"/>
-          <a:chExt cx="0" cy="0"/>
-        </a:xfrm>
-      </p:grpSpPr>
-      <p:sp>
-        <p:nvSpPr>
-          <p:cNvPr id="2" name="Title 1">
-            <a:extLst>
-              <a:ext uri="{FF2B5EF4-FFF2-40B4-BE49-F238E27FC236}">
-                <a16:creationId xmlns:a16="http://schemas.microsoft.com/office/drawing/2014/main" id="{D4C30A85-2277-4AED-93CC-D455D481D551}"/>
-              </a:ext>
-            </a:extLst>
-          </p:cNvPr>
-          <p:cNvSpPr>
-            <a:spLocks noGrp="1"/>
-          </p:cNvSpPr>
-          <p:nvPr>
-            <p:ph type="title"/>
-          </p:nvPr>
-        </p:nvSpPr>
-        <p:spPr/>
-        <p:txBody>
-          <a:bodyPr/>
-          <a:lstStyle/>
-          <a:p>
-            <a:r>
-              <a:rPr lang="en-US" dirty="0"/>
-              <a:t>PV/PVC lifecycle</a:t>
-            </a:r>
-          </a:p>
-        </p:txBody>
-      </p:sp>
-      <p:sp>
-        <p:nvSpPr>
-          <p:cNvPr id="3" name="Cylinder 2">
-            <a:extLst>
-              <a:ext uri="{FF2B5EF4-FFF2-40B4-BE49-F238E27FC236}">
-                <a16:creationId xmlns:a16="http://schemas.microsoft.com/office/drawing/2014/main" id="{793EEDFD-AF0F-41EC-8B33-559C22034EA9}"/>
-              </a:ext>
-            </a:extLst>
-          </p:cNvPr>
-          <p:cNvSpPr/>
-          <p:nvPr/>
-        </p:nvSpPr>
-        <p:spPr bwMode="gray">
-          <a:xfrm>
-            <a:off x="1766295" y="4104370"/>
-            <a:ext cx="1486490" cy="1104455"/>
-          </a:xfrm>
-          <a:prstGeom prst="can">
-            <a:avLst/>
-          </a:prstGeom>
-          <a:ln>
-            <a:headEnd/>
-            <a:tailEnd/>
-          </a:ln>
-        </p:spPr>
-        <p:style>
-          <a:lnRef idx="2">
-            <a:schemeClr val="accent2"/>
-          </a:lnRef>
-          <a:fillRef idx="1">
-            <a:schemeClr val="lt1"/>
-          </a:fillRef>
-          <a:effectRef idx="0">
-            <a:schemeClr val="accent2"/>
-          </a:effectRef>
-          <a:fontRef idx="minor">
-            <a:schemeClr val="dk1"/>
-          </a:fontRef>
-        </p:style>
-        <p:txBody>
-          <a:bodyPr lIns="90000" tIns="72000" rIns="90000" bIns="72000" rtlCol="0" anchor="ctr"/>
-          <a:lstStyle/>
-          <a:p>
-            <a:pPr marR="0" algn="ctr" defTabSz="914400" eaLnBrk="1" fontAlgn="base" latinLnBrk="0" hangingPunct="1">
-              <a:lnSpc>
-                <a:spcPct val="100000"/>
-              </a:lnSpc>
-              <a:spcBef>
-                <a:spcPct val="50000"/>
-              </a:spcBef>
-              <a:spcAft>
-                <a:spcPct val="0"/>
-              </a:spcAft>
-              <a:buClr>
-                <a:srgbClr val="F0AB00"/>
-              </a:buClr>
-              <a:buSzPct val="80000"/>
-              <a:tabLst/>
-            </a:pPr>
-            <a:r>
-              <a:rPr kumimoji="0" lang="en-US" sz="1800" b="0" i="0" u="none" strike="noStrike" kern="0" cap="none" spc="0" normalizeH="0" baseline="0" noProof="0" dirty="0">
-                <a:ln>
-                  <a:noFill/>
-                </a:ln>
-                <a:effectLst/>
-                <a:uLnTx/>
-                <a:uFillTx/>
-                <a:ea typeface="Arial Unicode MS" pitchFamily="34" charset="-128"/>
-                <a:cs typeface="Arial Unicode MS" pitchFamily="34" charset="-128"/>
-              </a:rPr>
-              <a:t>Persistent</a:t>
-            </a:r>
-            <a:r>
-              <a:rPr kumimoji="0" lang="en-US" sz="1800" b="0" i="0" u="none" strike="noStrike" kern="0" cap="none" spc="0" normalizeH="0" noProof="0" dirty="0">
-                <a:ln>
-                  <a:noFill/>
-                </a:ln>
-                <a:effectLst/>
-                <a:uLnTx/>
-                <a:uFillTx/>
-                <a:ea typeface="Arial Unicode MS" pitchFamily="34" charset="-128"/>
-                <a:cs typeface="Arial Unicode MS" pitchFamily="34" charset="-128"/>
-              </a:rPr>
-              <a:t> Volume</a:t>
-            </a:r>
-            <a:endParaRPr kumimoji="0" lang="en-US" sz="1800" b="0" i="0" u="none" strike="noStrike" kern="0" cap="none" spc="0" normalizeH="0" baseline="0" noProof="0" dirty="0">
-              <a:ln>
-                <a:noFill/>
-              </a:ln>
-              <a:effectLst/>
-              <a:uLnTx/>
-              <a:uFillTx/>
-              <a:ea typeface="Arial Unicode MS" pitchFamily="34" charset="-128"/>
-              <a:cs typeface="Arial Unicode MS" pitchFamily="34" charset="-128"/>
-            </a:endParaRPr>
-          </a:p>
-        </p:txBody>
-      </p:sp>
-      <p:sp>
-        <p:nvSpPr>
-          <p:cNvPr id="4" name="Rectangle: Diagonal Corners Rounded 3">
-            <a:extLst>
-              <a:ext uri="{FF2B5EF4-FFF2-40B4-BE49-F238E27FC236}">
-                <a16:creationId xmlns:a16="http://schemas.microsoft.com/office/drawing/2014/main" id="{A25A5F69-29A7-40A6-A263-64D33E2FFD63}"/>
-              </a:ext>
-            </a:extLst>
-          </p:cNvPr>
-          <p:cNvSpPr/>
-          <p:nvPr/>
-        </p:nvSpPr>
-        <p:spPr bwMode="gray">
-          <a:xfrm>
-            <a:off x="1607714" y="1799571"/>
-            <a:ext cx="1803653" cy="1112233"/>
-          </a:xfrm>
-          <a:prstGeom prst="round2DiagRect">
-            <a:avLst/>
-          </a:prstGeom>
-          <a:ln>
-            <a:headEnd/>
-            <a:tailEnd/>
-          </a:ln>
-        </p:spPr>
-        <p:style>
-          <a:lnRef idx="2">
-            <a:schemeClr val="accent2"/>
-          </a:lnRef>
-          <a:fillRef idx="1">
-            <a:schemeClr val="lt1"/>
-          </a:fillRef>
-          <a:effectRef idx="0">
-            <a:schemeClr val="accent2"/>
-          </a:effectRef>
-          <a:fontRef idx="minor">
-            <a:schemeClr val="dk1"/>
-          </a:fontRef>
-        </p:style>
-        <p:txBody>
-          <a:bodyPr lIns="90000" tIns="72000" rIns="90000" bIns="72000" rtlCol="0" anchor="ctr"/>
-          <a:lstStyle/>
-          <a:p>
-            <a:pPr algn="ctr" defTabSz="914400" fontAlgn="base">
-              <a:spcBef>
-                <a:spcPct val="50000"/>
-              </a:spcBef>
-              <a:spcAft>
-                <a:spcPct val="0"/>
-              </a:spcAft>
-              <a:buClr>
-                <a:srgbClr val="F0AB00"/>
-              </a:buClr>
-              <a:buSzPct val="80000"/>
-            </a:pPr>
-            <a:r>
-              <a:rPr lang="en-US" sz="1800" kern="0" dirty="0">
-                <a:solidFill>
-                  <a:schemeClr val="dk1"/>
-                </a:solidFill>
-                <a:latin typeface="+mn-lt"/>
-                <a:ea typeface="Arial Unicode MS" pitchFamily="34" charset="-128"/>
-                <a:cs typeface="Arial Unicode MS" pitchFamily="34" charset="-128"/>
-              </a:rPr>
-              <a:t>Persistent Volume Claim</a:t>
-            </a:r>
-          </a:p>
-        </p:txBody>
-      </p:sp>
-      <p:cxnSp>
-        <p:nvCxnSpPr>
-          <p:cNvPr id="5" name="Connector: Elbow 4">
-            <a:extLst>
-              <a:ext uri="{FF2B5EF4-FFF2-40B4-BE49-F238E27FC236}">
-                <a16:creationId xmlns:a16="http://schemas.microsoft.com/office/drawing/2014/main" id="{289FB161-7F8C-48C7-BC19-20271537C9C8}"/>
-              </a:ext>
-            </a:extLst>
-          </p:cNvPr>
-          <p:cNvCxnSpPr>
-            <a:cxnSpLocks/>
-            <a:stCxn id="4" idx="1"/>
-            <a:endCxn id="3" idx="1"/>
-          </p:cNvCxnSpPr>
-          <p:nvPr/>
-        </p:nvCxnSpPr>
-        <p:spPr>
-          <a:xfrm rot="5400000">
-            <a:off x="1913258" y="3508087"/>
-            <a:ext cx="1192566" cy="1"/>
-          </a:xfrm>
-          <a:prstGeom prst="bentConnector3">
-            <a:avLst>
-              <a:gd name="adj1" fmla="val 50000"/>
-            </a:avLst>
-          </a:prstGeom>
-          <a:ln w="57150">
-            <a:solidFill>
-              <a:schemeClr val="tx1"/>
-            </a:solidFill>
-            <a:headEnd type="triangle"/>
-            <a:tailEnd type="triangle"/>
-          </a:ln>
-        </p:spPr>
-        <p:style>
-          <a:lnRef idx="1">
-            <a:schemeClr val="accent1"/>
-          </a:lnRef>
-          <a:fillRef idx="0">
-            <a:schemeClr val="accent1"/>
-          </a:fillRef>
-          <a:effectRef idx="0">
-            <a:schemeClr val="accent1"/>
-          </a:effectRef>
-          <a:fontRef idx="minor">
-            <a:schemeClr val="tx1"/>
-          </a:fontRef>
-        </p:style>
-      </p:cxnSp>
-      <p:sp>
-        <p:nvSpPr>
-          <p:cNvPr id="11" name="Cross 10">
-            <a:extLst>
-              <a:ext uri="{FF2B5EF4-FFF2-40B4-BE49-F238E27FC236}">
-                <a16:creationId xmlns:a16="http://schemas.microsoft.com/office/drawing/2014/main" id="{8005E16A-1D9F-4051-A2FD-6E81E44F746D}"/>
-              </a:ext>
-            </a:extLst>
-          </p:cNvPr>
-          <p:cNvSpPr/>
-          <p:nvPr/>
-        </p:nvSpPr>
-        <p:spPr bwMode="gray">
-          <a:xfrm rot="2690790">
-            <a:off x="1611871" y="1453212"/>
-            <a:ext cx="1795337" cy="1804951"/>
-          </a:xfrm>
-          <a:prstGeom prst="plus">
-            <a:avLst>
-              <a:gd name="adj" fmla="val 44715"/>
-            </a:avLst>
-          </a:prstGeom>
-          <a:solidFill>
-            <a:schemeClr val="accent5">
-              <a:lumMod val="40000"/>
-              <a:lumOff val="60000"/>
-            </a:schemeClr>
-          </a:solidFill>
-          <a:ln>
-            <a:headEnd/>
-            <a:tailEnd/>
-          </a:ln>
-        </p:spPr>
-        <p:style>
-          <a:lnRef idx="2">
-            <a:schemeClr val="accent5"/>
-          </a:lnRef>
-          <a:fillRef idx="1">
-            <a:schemeClr val="lt1"/>
-          </a:fillRef>
-          <a:effectRef idx="0">
-            <a:schemeClr val="accent5"/>
-          </a:effectRef>
-          <a:fontRef idx="minor">
-            <a:schemeClr val="dk1"/>
-          </a:fontRef>
-        </p:style>
-        <p:txBody>
-          <a:bodyPr lIns="90000" tIns="72000" rIns="90000" bIns="72000" rtlCol="0" anchor="ctr"/>
-          <a:lstStyle/>
-          <a:p>
-            <a:pPr marR="0" algn="ctr" defTabSz="914400" eaLnBrk="1" fontAlgn="base" latinLnBrk="0" hangingPunct="1">
-              <a:lnSpc>
-                <a:spcPct val="100000"/>
-              </a:lnSpc>
-              <a:spcBef>
-                <a:spcPct val="50000"/>
-              </a:spcBef>
-              <a:spcAft>
-                <a:spcPct val="0"/>
-              </a:spcAft>
-              <a:buClr>
-                <a:srgbClr val="F0AB00"/>
-              </a:buClr>
-              <a:buSzPct val="80000"/>
-              <a:tabLst/>
-            </a:pPr>
-            <a:endParaRPr kumimoji="0" lang="en-US" sz="1800" b="0" i="0" u="none" strike="noStrike" kern="0" cap="none" spc="0" normalizeH="0" baseline="0" noProof="0" dirty="0" err="1">
-              <a:ln>
-                <a:noFill/>
-              </a:ln>
-              <a:effectLst/>
-              <a:uLnTx/>
-              <a:uFillTx/>
-              <a:ea typeface="Arial Unicode MS" pitchFamily="34" charset="-128"/>
-              <a:cs typeface="Arial Unicode MS" pitchFamily="34" charset="-128"/>
-            </a:endParaRPr>
-          </a:p>
-        </p:txBody>
-      </p:sp>
-      <p:sp>
-        <p:nvSpPr>
-          <p:cNvPr id="12" name="Rectangle 11">
-            <a:extLst>
-              <a:ext uri="{FF2B5EF4-FFF2-40B4-BE49-F238E27FC236}">
-                <a16:creationId xmlns:a16="http://schemas.microsoft.com/office/drawing/2014/main" id="{FD94F29F-DC71-4824-9A4B-4881FA97C554}"/>
-              </a:ext>
-            </a:extLst>
-          </p:cNvPr>
-          <p:cNvSpPr/>
-          <p:nvPr/>
-        </p:nvSpPr>
-        <p:spPr>
-          <a:xfrm>
-            <a:off x="4153475" y="1986088"/>
-            <a:ext cx="7537002" cy="2031325"/>
-          </a:xfrm>
-          <a:prstGeom prst="rect">
-            <a:avLst/>
-          </a:prstGeom>
-        </p:spPr>
-        <p:txBody>
-          <a:bodyPr wrap="square">
-            <a:spAutoFit/>
-          </a:bodyPr>
-          <a:lstStyle/>
-          <a:p>
-            <a:r>
-              <a:rPr lang="en-US" dirty="0"/>
-              <a:t>Deleting a PVC could cause the following:</a:t>
-            </a:r>
-          </a:p>
-          <a:p>
-            <a:pPr marL="342900" indent="-342900">
-              <a:buFont typeface="Wingdings" panose="05000000000000000000" pitchFamily="2" charset="2"/>
-              <a:buChar char="§"/>
-            </a:pPr>
-            <a:r>
-              <a:rPr lang="en-US" dirty="0"/>
-              <a:t>Retain – PV still exists including all data</a:t>
-            </a:r>
-          </a:p>
-          <a:p>
-            <a:pPr marL="342900" indent="-342900">
-              <a:buFont typeface="Wingdings" panose="05000000000000000000" pitchFamily="2" charset="2"/>
-              <a:buChar char="§"/>
-            </a:pPr>
-            <a:r>
-              <a:rPr lang="en-US" dirty="0"/>
-              <a:t>Delete – delete the PV and all data</a:t>
-            </a:r>
-          </a:p>
-          <a:p>
-            <a:pPr marL="342900" indent="-342900">
-              <a:buFont typeface="Wingdings" panose="05000000000000000000" pitchFamily="2" charset="2"/>
-              <a:buChar char="§"/>
-            </a:pPr>
-            <a:r>
-              <a:rPr lang="en-US" dirty="0"/>
-              <a:t>Recycle – delete data and make PV available again to be bound by a different PVC</a:t>
-            </a:r>
-          </a:p>
-          <a:p>
-            <a:pPr marL="342900" indent="-342900">
-              <a:buFont typeface="Wingdings" panose="05000000000000000000" pitchFamily="2" charset="2"/>
-              <a:buChar char="§"/>
-            </a:pPr>
-            <a:endParaRPr lang="en-US" dirty="0"/>
-          </a:p>
-        </p:txBody>
-      </p:sp>
-    </p:spTree>
-    <p:extLst>
-      <p:ext uri="{BB962C8B-B14F-4D97-AF65-F5344CB8AC3E}">
-        <p14:creationId xmlns:p14="http://schemas.microsoft.com/office/powerpoint/2010/main" val="2934522516"/>
-      </p:ext>
-    </p:extLst>
-  </p:cSld>
-  <p:clrMapOvr>
-    <a:masterClrMapping/>
-  </p:clrMapOvr>
-  <p:timing>
-    <p:tnLst>
-      <p:par>
-        <p:cTn id="1" dur="indefinite" restart="never" nodeType="tmRoot">
-          <p:childTnLst>
-            <p:seq concurrent="1" nextAc="seek">
-              <p:cTn id="2" dur="indefinite" nodeType="mainSeq">
-                <p:childTnLst>
-                  <p:par>
-                    <p:cTn id="3" fill="hold">
-                      <p:stCondLst>
-                        <p:cond delay="indefinite"/>
-                      </p:stCondLst>
-                      <p:childTnLst>
-                        <p:par>
-                          <p:cTn id="4" fill="hold">
-                            <p:stCondLst>
-                              <p:cond delay="0"/>
-                            </p:stCondLst>
-                            <p:childTnLst>
-                              <p:par>
-                                <p:cTn id="5" presetID="1" presetClass="entr" presetSubtype="0" fill="hold" grpId="0" nodeType="clickEffect">
-                                  <p:stCondLst>
-                                    <p:cond delay="0"/>
-                                  </p:stCondLst>
-                                  <p:childTnLst>
-                                    <p:set>
-                                      <p:cBhvr>
-                                        <p:cTn id="6" dur="1" fill="hold">
-                                          <p:stCondLst>
-                                            <p:cond delay="0"/>
-                                          </p:stCondLst>
-                                        </p:cTn>
-                                        <p:tgtEl>
-                                          <p:spTgt spid="11"/>
-                                        </p:tgtEl>
-                                        <p:attrNameLst>
-                                          <p:attrName>style.visibility</p:attrName>
-                                        </p:attrNameLst>
-                                      </p:cBhvr>
-                                      <p:to>
-                                        <p:strVal val="visible"/>
-                                      </p:to>
-                                    </p:set>
-                                  </p:childTnLst>
-                                </p:cTn>
-                              </p:par>
-                              <p:par>
-                                <p:cTn id="7" presetID="1" presetClass="entr" presetSubtype="0" fill="hold" grpId="0" nodeType="withEffect">
-                                  <p:stCondLst>
-                                    <p:cond delay="0"/>
-                                  </p:stCondLst>
-                                  <p:childTnLst>
-                                    <p:set>
-                                      <p:cBhvr>
-                                        <p:cTn id="8" dur="1" fill="hold">
-                                          <p:stCondLst>
-                                            <p:cond delay="0"/>
-                                          </p:stCondLst>
-                                        </p:cTn>
-                                        <p:tgtEl>
-                                          <p:spTgt spid="12"/>
-                                        </p:tgtEl>
-                                        <p:attrNameLst>
-                                          <p:attrName>style.visibility</p:attrName>
-                                        </p:attrNameLst>
-                                      </p:cBhvr>
-                                      <p:to>
-                                        <p:strVal val="visible"/>
-                                      </p:to>
-                                    </p:set>
-                                  </p:childTnLst>
-                                </p:cTn>
-                              </p:par>
-                            </p:childTnLst>
-                          </p:cTn>
-                        </p:par>
-                      </p:childTnLst>
-                    </p:cTn>
-                  </p:par>
-                </p:childTnLst>
-              </p:cTn>
-              <p:prevCondLst>
-                <p:cond evt="onPrev" delay="0">
-                  <p:tgtEl>
-                    <p:sldTgt/>
-                  </p:tgtEl>
-                </p:cond>
-              </p:prevCondLst>
-              <p:nextCondLst>
-                <p:cond evt="onNext" delay="0">
-                  <p:tgtEl>
-                    <p:sldTgt/>
-                  </p:tgtEl>
-                </p:cond>
-              </p:nextCondLst>
-            </p:seq>
-          </p:childTnLst>
-        </p:cTn>
-      </p:par>
-    </p:tnLst>
-    <p:bldLst>
-      <p:bldP spid="11" grpId="0" animBg="1"/>
-      <p:bldP spid="12" grpId="0"/>
-    </p:bldLst>
-  </p:timing>
-</p:sld>
-</file>
-
-<file path=ppt/slides/slide15.xml><?xml version="1.0" encoding="utf-8"?>
+<file path=ppt/slides/slide16.xml><?xml version="1.0" encoding="utf-8"?>
 <p:sld xmlns:a="http://schemas.openxmlformats.org/drawingml/2006/main" xmlns:r="http://schemas.openxmlformats.org/officeDocument/2006/relationships" xmlns:p="http://schemas.openxmlformats.org/presentationml/2006/main" show="0">
   <p:cSld>
     <p:spTree>
@@ -27483,7 +29062,7 @@
 </p:sld>
 </file>
 
-<file path=ppt/slides/slide16.xml><?xml version="1.0" encoding="utf-8"?>
+<file path=ppt/slides/slide17.xml><?xml version="1.0" encoding="utf-8"?>
 <p:sld xmlns:a="http://schemas.openxmlformats.org/drawingml/2006/main" xmlns:r="http://schemas.openxmlformats.org/officeDocument/2006/relationships" xmlns:p="http://schemas.openxmlformats.org/presentationml/2006/main">
   <p:cSld>
     <p:spTree>
@@ -27565,7 +29144,7 @@
 </p:sld>
 </file>
 
-<file path=ppt/slides/slide17.xml><?xml version="1.0" encoding="utf-8"?>
+<file path=ppt/slides/slide18.xml><?xml version="1.0" encoding="utf-8"?>
 <p:sld xmlns:a="http://schemas.openxmlformats.org/drawingml/2006/main" xmlns:r="http://schemas.openxmlformats.org/officeDocument/2006/relationships" xmlns:p="http://schemas.openxmlformats.org/presentationml/2006/main">
   <p:cSld>
     <p:spTree>
@@ -28498,7 +30077,7 @@
 </p:sld>
 </file>
 
-<file path=ppt/slides/slide18.xml><?xml version="1.0" encoding="utf-8"?>
+<file path=ppt/slides/slide19.xml><?xml version="1.0" encoding="utf-8"?>
 <p:sld xmlns:a="http://schemas.openxmlformats.org/drawingml/2006/main" xmlns:r="http://schemas.openxmlformats.org/officeDocument/2006/relationships" xmlns:p="http://schemas.openxmlformats.org/presentationml/2006/main" show="0">
   <p:cSld>
     <p:spTree>
@@ -28995,32 +30574,6 @@
 </p:sld>
 </file>
 
-<file path=ppt/slides/slide19.xml><?xml version="1.0" encoding="utf-8"?>
-<p:sld xmlns:a="http://schemas.openxmlformats.org/drawingml/2006/main" xmlns:r="http://schemas.openxmlformats.org/officeDocument/2006/relationships" xmlns:p="http://schemas.openxmlformats.org/presentationml/2006/main" show="0">
-  <p:cSld>
-    <p:spTree>
-      <p:nvGrpSpPr>
-        <p:cNvPr id="1" name=""/>
-        <p:cNvGrpSpPr/>
-        <p:nvPr/>
-      </p:nvGrpSpPr>
-      <p:grpSpPr>
-        <a:xfrm>
-          <a:off x="0" y="0"/>
-          <a:ext cx="0" cy="0"/>
-          <a:chOff x="0" y="0"/>
-          <a:chExt cx="0" cy="0"/>
-        </a:xfrm>
-      </p:grpSpPr>
-    </p:spTree>
-  </p:cSld>
-  <p:clrMapOvr>
-    <a:masterClrMapping/>
-  </p:clrMapOvr>
-  <p:transition spd="med"/>
-</p:sld>
-</file>
-
 <file path=ppt/slides/slide2.xml><?xml version="1.0" encoding="utf-8"?>
 <p:sld xmlns:a="http://schemas.openxmlformats.org/drawingml/2006/main" xmlns:r="http://schemas.openxmlformats.org/officeDocument/2006/relationships" xmlns:p="http://schemas.openxmlformats.org/presentationml/2006/main">
   <p:cSld>
@@ -29572,6 +31125,32 @@
   <p:clrMapOvr>
     <a:masterClrMapping/>
   </p:clrMapOvr>
+</p:sld>
+</file>
+
+<file path=ppt/slides/slide20.xml><?xml version="1.0" encoding="utf-8"?>
+<p:sld xmlns:a="http://schemas.openxmlformats.org/drawingml/2006/main" xmlns:r="http://schemas.openxmlformats.org/officeDocument/2006/relationships" xmlns:p="http://schemas.openxmlformats.org/presentationml/2006/main" show="0">
+  <p:cSld>
+    <p:spTree>
+      <p:nvGrpSpPr>
+        <p:cNvPr id="1" name=""/>
+        <p:cNvGrpSpPr/>
+        <p:nvPr/>
+      </p:nvGrpSpPr>
+      <p:grpSpPr>
+        <a:xfrm>
+          <a:off x="0" y="0"/>
+          <a:ext cx="0" cy="0"/>
+          <a:chOff x="0" y="0"/>
+          <a:chExt cx="0" cy="0"/>
+        </a:xfrm>
+      </p:grpSpPr>
+    </p:spTree>
+  </p:cSld>
+  <p:clrMapOvr>
+    <a:masterClrMapping/>
+  </p:clrMapOvr>
+  <p:transition spd="med"/>
 </p:sld>
 </file>
 

</xml_diff>